<commit_message>
Apresentação, telas de exemplo
</commit_message>
<xml_diff>
--- a/CAP385-00-Presentations/01-MATLAB xUnit Test Framework.pptx
+++ b/CAP385-00-Presentations/01-MATLAB xUnit Test Framework.pptx
@@ -5,15 +5,18 @@
     <p:sldMasterId id="2147483648" r:id="rId1"/>
   </p:sldMasterIdLst>
   <p:notesMasterIdLst>
-    <p:notesMasterId r:id="rId8"/>
+    <p:notesMasterId r:id="rId11"/>
   </p:notesMasterIdLst>
   <p:sldIdLst>
     <p:sldId id="257" r:id="rId2"/>
     <p:sldId id="271" r:id="rId3"/>
     <p:sldId id="265" r:id="rId4"/>
     <p:sldId id="272" r:id="rId5"/>
-    <p:sldId id="267" r:id="rId6"/>
-    <p:sldId id="270" r:id="rId7"/>
+    <p:sldId id="273" r:id="rId6"/>
+    <p:sldId id="274" r:id="rId7"/>
+    <p:sldId id="275" r:id="rId8"/>
+    <p:sldId id="276" r:id="rId9"/>
+    <p:sldId id="277" r:id="rId10"/>
   </p:sldIdLst>
   <p:sldSz cx="9144000" cy="6858000" type="screen4x3"/>
   <p:notesSz cx="6858000" cy="9144000"/>
@@ -538,88 +541,6 @@
               <a:t>1</a:t>
             </a:fld>
             <a:endParaRPr lang="en-US" dirty="0"/>
-          </a:p>
-        </p:txBody>
-      </p:sp>
-    </p:spTree>
-  </p:cSld>
-  <p:clrMapOvr>
-    <a:masterClrMapping/>
-  </p:clrMapOvr>
-</p:notes>
-</file>
-
-<file path=ppt/notesSlides/notesSlide2.xml><?xml version="1.0" encoding="utf-8"?>
-<p:notes xmlns:a="http://schemas.openxmlformats.org/drawingml/2006/main" xmlns:r="http://schemas.openxmlformats.org/officeDocument/2006/relationships" xmlns:p="http://schemas.openxmlformats.org/presentationml/2006/main">
-  <p:cSld>
-    <p:spTree>
-      <p:nvGrpSpPr>
-        <p:cNvPr id="1" name=""/>
-        <p:cNvGrpSpPr/>
-        <p:nvPr/>
-      </p:nvGrpSpPr>
-      <p:grpSpPr>
-        <a:xfrm>
-          <a:off x="0" y="0"/>
-          <a:ext cx="0" cy="0"/>
-          <a:chOff x="0" y="0"/>
-          <a:chExt cx="0" cy="0"/>
-        </a:xfrm>
-      </p:grpSpPr>
-      <p:sp>
-        <p:nvSpPr>
-          <p:cNvPr id="2" name="Espaço Reservado para Imagem de Slide 1"/>
-          <p:cNvSpPr>
-            <a:spLocks noGrp="1" noRot="1" noChangeAspect="1"/>
-          </p:cNvSpPr>
-          <p:nvPr>
-            <p:ph type="sldImg"/>
-          </p:nvPr>
-        </p:nvSpPr>
-        <p:spPr/>
-      </p:sp>
-      <p:sp>
-        <p:nvSpPr>
-          <p:cNvPr id="3" name="Espaço Reservado para Anotações 2"/>
-          <p:cNvSpPr>
-            <a:spLocks noGrp="1"/>
-          </p:cNvSpPr>
-          <p:nvPr>
-            <p:ph type="body" idx="1"/>
-          </p:nvPr>
-        </p:nvSpPr>
-        <p:spPr/>
-        <p:txBody>
-          <a:bodyPr>
-            <a:normAutofit/>
-          </a:bodyPr>
-          <a:lstStyle/>
-          <a:p>
-            <a:endParaRPr lang="pt-BR" dirty="0"/>
-          </a:p>
-        </p:txBody>
-      </p:sp>
-      <p:sp>
-        <p:nvSpPr>
-          <p:cNvPr id="4" name="Espaço Reservado para Número de Slide 3"/>
-          <p:cNvSpPr>
-            <a:spLocks noGrp="1"/>
-          </p:cNvSpPr>
-          <p:nvPr>
-            <p:ph type="sldNum" sz="quarter" idx="10"/>
-          </p:nvPr>
-        </p:nvSpPr>
-        <p:spPr/>
-        <p:txBody>
-          <a:bodyPr/>
-          <a:lstStyle/>
-          <a:p>
-            <a:fld id="{C303B0A8-E44F-4953-80FF-1C36A090D810}" type="slidenum">
-              <a:rPr lang="pt-BR" smtClean="0"/>
-              <a:pPr/>
-              <a:t>6</a:t>
-            </a:fld>
-            <a:endParaRPr lang="pt-BR"/>
           </a:p>
         </p:txBody>
       </p:sp>
@@ -4500,7 +4421,7 @@
           <a:lstStyle/>
           <a:p>
             <a:r>
-              <a:rPr lang="pt-BR" smtClean="0">
+              <a:rPr lang="pt-BR" dirty="0" smtClean="0">
                 <a:solidFill>
                   <a:srgbClr val="0070C0"/>
                 </a:solidFill>
@@ -4514,7 +4435,7 @@
               </a:rPr>
               <a:t>Introdução</a:t>
             </a:r>
-            <a:endParaRPr lang="pt-BR">
+            <a:endParaRPr lang="pt-BR" dirty="0">
               <a:solidFill>
                 <a:srgbClr val="0070C0"/>
               </a:solidFill>
@@ -4818,10 +4739,15 @@
             <p:ph type="title"/>
           </p:nvPr>
         </p:nvSpPr>
-        <p:spPr/>
+        <p:spPr>
+          <a:xfrm>
+            <a:off x="457200" y="228600"/>
+            <a:ext cx="8229600" cy="1400200"/>
+          </a:xfrm>
+        </p:spPr>
         <p:txBody>
           <a:bodyPr>
-            <a:normAutofit/>
+            <a:normAutofit fontScale="90000"/>
           </a:bodyPr>
           <a:lstStyle/>
           <a:p>
@@ -4838,7 +4764,67 @@
                   </a:outerShdw>
                 </a:effectLst>
               </a:rPr>
-              <a:t>Framework para Teste Unitário</a:t>
+              <a:t>Apresentação do </a:t>
+            </a:r>
+            <a:r>
+              <a:rPr lang="en-US" dirty="0">
+                <a:solidFill>
+                  <a:srgbClr val="0070C0"/>
+                </a:solidFill>
+                <a:effectLst>
+                  <a:outerShdw blurRad="38100" dist="38100" dir="2700000" algn="tl">
+                    <a:srgbClr val="000000">
+                      <a:alpha val="43137"/>
+                    </a:srgbClr>
+                  </a:outerShdw>
+                </a:effectLst>
+              </a:rPr>
+              <a:t>MATLAB </a:t>
+            </a:r>
+            <a:r>
+              <a:rPr lang="en-US" dirty="0" err="1">
+                <a:solidFill>
+                  <a:srgbClr val="0070C0"/>
+                </a:solidFill>
+                <a:effectLst>
+                  <a:outerShdw blurRad="38100" dist="38100" dir="2700000" algn="tl">
+                    <a:srgbClr val="000000">
+                      <a:alpha val="43137"/>
+                    </a:srgbClr>
+                  </a:outerShdw>
+                </a:effectLst>
+              </a:rPr>
+              <a:t>xUnit</a:t>
+            </a:r>
+            <a:r>
+              <a:rPr lang="en-US" dirty="0">
+                <a:solidFill>
+                  <a:srgbClr val="0070C0"/>
+                </a:solidFill>
+                <a:effectLst>
+                  <a:outerShdw blurRad="38100" dist="38100" dir="2700000" algn="tl">
+                    <a:srgbClr val="000000">
+                      <a:alpha val="43137"/>
+                    </a:srgbClr>
+                  </a:outerShdw>
+                </a:effectLst>
+              </a:rPr>
+              <a:t> Test </a:t>
+            </a:r>
+            <a:r>
+              <a:rPr lang="pt-BR" dirty="0" smtClean="0">
+                <a:solidFill>
+                  <a:srgbClr val="0070C0"/>
+                </a:solidFill>
+                <a:effectLst>
+                  <a:outerShdw blurRad="38100" dist="38100" dir="2700000" algn="tl">
+                    <a:srgbClr val="000000">
+                      <a:alpha val="43137"/>
+                    </a:srgbClr>
+                  </a:outerShdw>
+                </a:effectLst>
+              </a:rPr>
+              <a:t>Framework</a:t>
             </a:r>
             <a:endParaRPr lang="pt-BR" dirty="0">
               <a:solidFill>
@@ -4865,102 +4851,116 @@
             <p:ph idx="1"/>
           </p:nvPr>
         </p:nvSpPr>
-        <p:spPr/>
+        <p:spPr>
+          <a:xfrm>
+            <a:off x="457200" y="1844824"/>
+            <a:ext cx="8229600" cy="4205139"/>
+          </a:xfrm>
+        </p:spPr>
         <p:txBody>
           <a:bodyPr>
-            <a:normAutofit fontScale="77500" lnSpcReduction="20000"/>
+            <a:noAutofit/>
           </a:bodyPr>
           <a:lstStyle/>
           <a:p>
             <a:r>
-              <a:rPr lang="pt-BR" dirty="0"/>
-              <a:t>MATLAB </a:t>
-            </a:r>
-            <a:r>
-              <a:rPr lang="pt-BR" dirty="0" err="1"/>
-              <a:t>xUnit</a:t>
-            </a:r>
-            <a:r>
-              <a:rPr lang="pt-BR" dirty="0"/>
-              <a:t> Test Framework</a:t>
-            </a:r>
-            <a:endParaRPr lang="pt-BR" dirty="0" smtClean="0"/>
+              <a:rPr lang="pt-BR" sz="2800" dirty="0" smtClean="0"/>
+              <a:t>Testar a funcionalidade e desempenho do código MATLAB</a:t>
+            </a:r>
           </a:p>
           <a:p>
             <a:pPr lvl="1"/>
             <a:r>
-              <a:rPr lang="en-US" dirty="0"/>
-              <a:t>Test the functionality and performance of your MATLAB® code</a:t>
-            </a:r>
-          </a:p>
-          <a:p>
-            <a:pPr lvl="2"/>
-            <a:r>
-              <a:rPr lang="en-US" dirty="0"/>
-              <a:t>Testing your code is an integral part of developing quality software. To guide software development and monitor for regressions in code functionality, you can write unit tests for your programs. To measure the time it takes for your code (or your tests) to run, you can write performance tests.</a:t>
+              <a:rPr lang="pt-BR" sz="2400" dirty="0" smtClean="0"/>
+              <a:t>Código </a:t>
+            </a:r>
+            <a:r>
+              <a:rPr lang="pt-BR" sz="2400" dirty="0"/>
+              <a:t>de </a:t>
+            </a:r>
+            <a:r>
+              <a:rPr lang="pt-BR" sz="2400" dirty="0">
+                <a:solidFill>
+                  <a:srgbClr val="FF0000"/>
+                </a:solidFill>
+              </a:rPr>
+              <a:t>testes de unidade </a:t>
+            </a:r>
+            <a:r>
+              <a:rPr lang="pt-BR" sz="2400" dirty="0"/>
+              <a:t>(teste de funções ou classes) </a:t>
+            </a:r>
+            <a:r>
+              <a:rPr lang="pt-BR" sz="2400" dirty="0" smtClean="0"/>
+              <a:t>como estratégia para atingir </a:t>
+            </a:r>
+            <a:r>
+              <a:rPr lang="pt-BR" sz="2400" dirty="0" smtClean="0">
+                <a:solidFill>
+                  <a:srgbClr val="FF0000"/>
+                </a:solidFill>
+              </a:rPr>
+              <a:t>qualidade</a:t>
+            </a:r>
+            <a:r>
+              <a:rPr lang="pt-BR" sz="2400" dirty="0" smtClean="0"/>
+              <a:t> no desenvolvimento de software </a:t>
             </a:r>
           </a:p>
           <a:p>
             <a:pPr lvl="1"/>
-            <a:endParaRPr lang="en-US" dirty="0"/>
+            <a:r>
+              <a:rPr lang="pt-BR" sz="2400" dirty="0" smtClean="0"/>
+              <a:t>Possibilita </a:t>
+            </a:r>
+            <a:r>
+              <a:rPr lang="pt-BR" sz="2400" dirty="0" smtClean="0">
+                <a:solidFill>
+                  <a:srgbClr val="FF0000"/>
+                </a:solidFill>
+              </a:rPr>
+              <a:t>guiar</a:t>
+            </a:r>
+            <a:r>
+              <a:rPr lang="pt-BR" sz="2400" dirty="0" smtClean="0"/>
+              <a:t> o desenvolvimento e </a:t>
+            </a:r>
+            <a:r>
+              <a:rPr lang="pt-BR" sz="2400" dirty="0" smtClean="0">
+                <a:solidFill>
+                  <a:srgbClr val="FF0000"/>
+                </a:solidFill>
+              </a:rPr>
+              <a:t>monitorar a regressão da funcionalidade </a:t>
+            </a:r>
+            <a:r>
+              <a:rPr lang="pt-BR" sz="2400" dirty="0" smtClean="0"/>
+              <a:t>do código, além de possibilitar a medição do </a:t>
+            </a:r>
+            <a:r>
+              <a:rPr lang="pt-BR" sz="2400" dirty="0" smtClean="0">
+                <a:solidFill>
+                  <a:srgbClr val="FF0000"/>
+                </a:solidFill>
+              </a:rPr>
+              <a:t>tempo de execução </a:t>
+            </a:r>
+            <a:r>
+              <a:rPr lang="pt-BR" sz="2400" dirty="0" smtClean="0"/>
+              <a:t>do código e assim depurar o desempenho do código.</a:t>
+            </a:r>
           </a:p>
           <a:p>
             <a:pPr lvl="1"/>
             <a:r>
-              <a:rPr lang="en-US" dirty="0" smtClean="0"/>
-              <a:t>Function-Based </a:t>
-            </a:r>
-            <a:r>
-              <a:rPr lang="en-US" dirty="0"/>
-              <a:t>Unit Tests</a:t>
-            </a:r>
-          </a:p>
-          <a:p>
-            <a:pPr lvl="2"/>
-            <a:r>
-              <a:rPr lang="en-US" dirty="0"/>
-              <a:t>Write tests using qualifications; customize test runner; select and run tests</a:t>
-            </a:r>
-          </a:p>
-          <a:p>
-            <a:pPr lvl="1"/>
-            <a:r>
-              <a:rPr lang="en-US" dirty="0" smtClean="0"/>
-              <a:t>Class-Based </a:t>
-            </a:r>
-            <a:r>
-              <a:rPr lang="en-US" dirty="0"/>
-              <a:t>Unit Tests</a:t>
-            </a:r>
-          </a:p>
-          <a:p>
-            <a:pPr lvl="2"/>
-            <a:r>
-              <a:rPr lang="en-US" dirty="0"/>
-              <a:t>Write class-based tests; parameterize tests; apply fixtures; select and run tests</a:t>
-            </a:r>
-          </a:p>
-          <a:p>
-            <a:pPr lvl="1"/>
-            <a:r>
-              <a:rPr lang="en-US" dirty="0"/>
-              <a:t>Extend Unit Testing Framework</a:t>
-            </a:r>
-          </a:p>
-          <a:p>
-            <a:pPr lvl="2"/>
-            <a:r>
-              <a:rPr lang="en-US" dirty="0"/>
-              <a:t>Customize testing environment; author constraints, fixtures, diagnostics, and plugins</a:t>
-            </a:r>
-          </a:p>
-          <a:p>
-            <a:pPr lvl="1"/>
-            <a:endParaRPr lang="pt-BR" dirty="0" smtClean="0"/>
-          </a:p>
-          <a:p>
-            <a:pPr lvl="1"/>
-            <a:endParaRPr lang="pt-BR" dirty="0" smtClean="0"/>
+              <a:rPr lang="pt-BR" sz="2400" dirty="0"/>
+              <a:t>A partir da versão </a:t>
+            </a:r>
+            <a:r>
+              <a:rPr lang="pt-BR" sz="2400" dirty="0" smtClean="0"/>
+              <a:t>R2013a</a:t>
+            </a:r>
+            <a:endParaRPr lang="pt-BR" sz="2400" dirty="0"/>
           </a:p>
         </p:txBody>
       </p:sp>
@@ -5121,7 +5121,12 @@
             <p:ph type="title"/>
           </p:nvPr>
         </p:nvSpPr>
-        <p:spPr/>
+        <p:spPr>
+          <a:xfrm>
+            <a:off x="457200" y="228600"/>
+            <a:ext cx="8229600" cy="1400200"/>
+          </a:xfrm>
+        </p:spPr>
         <p:txBody>
           <a:bodyPr>
             <a:normAutofit fontScale="90000"/>
@@ -5129,7 +5134,7 @@
           <a:lstStyle/>
           <a:p>
             <a:r>
-              <a:rPr lang="en-US" dirty="0" smtClean="0">
+              <a:rPr lang="pt-BR" dirty="0" smtClean="0">
                 <a:solidFill>
                   <a:srgbClr val="0070C0"/>
                 </a:solidFill>
@@ -5141,9 +5146,69 @@
                   </a:outerShdw>
                 </a:effectLst>
               </a:rPr>
-              <a:t>Content-Based – Solution / Withdraws</a:t>
-            </a:r>
-            <a:endParaRPr lang="en-US" dirty="0">
+              <a:t>Apresentação do </a:t>
+            </a:r>
+            <a:r>
+              <a:rPr lang="en-US" dirty="0">
+                <a:solidFill>
+                  <a:srgbClr val="0070C0"/>
+                </a:solidFill>
+                <a:effectLst>
+                  <a:outerShdw blurRad="38100" dist="38100" dir="2700000" algn="tl">
+                    <a:srgbClr val="000000">
+                      <a:alpha val="43137"/>
+                    </a:srgbClr>
+                  </a:outerShdw>
+                </a:effectLst>
+              </a:rPr>
+              <a:t>MATLAB </a:t>
+            </a:r>
+            <a:r>
+              <a:rPr lang="en-US" dirty="0" err="1">
+                <a:solidFill>
+                  <a:srgbClr val="0070C0"/>
+                </a:solidFill>
+                <a:effectLst>
+                  <a:outerShdw blurRad="38100" dist="38100" dir="2700000" algn="tl">
+                    <a:srgbClr val="000000">
+                      <a:alpha val="43137"/>
+                    </a:srgbClr>
+                  </a:outerShdw>
+                </a:effectLst>
+              </a:rPr>
+              <a:t>xUnit</a:t>
+            </a:r>
+            <a:r>
+              <a:rPr lang="en-US" dirty="0">
+                <a:solidFill>
+                  <a:srgbClr val="0070C0"/>
+                </a:solidFill>
+                <a:effectLst>
+                  <a:outerShdw blurRad="38100" dist="38100" dir="2700000" algn="tl">
+                    <a:srgbClr val="000000">
+                      <a:alpha val="43137"/>
+                    </a:srgbClr>
+                  </a:outerShdw>
+                </a:effectLst>
+              </a:rPr>
+              <a:t> Test </a:t>
+            </a:r>
+            <a:r>
+              <a:rPr lang="pt-BR" dirty="0" smtClean="0">
+                <a:solidFill>
+                  <a:srgbClr val="0070C0"/>
+                </a:solidFill>
+                <a:effectLst>
+                  <a:outerShdw blurRad="38100" dist="38100" dir="2700000" algn="tl">
+                    <a:srgbClr val="000000">
+                      <a:alpha val="43137"/>
+                    </a:srgbClr>
+                  </a:outerShdw>
+                </a:effectLst>
+              </a:rPr>
+              <a:t>Framework</a:t>
+            </a:r>
+            <a:endParaRPr lang="pt-BR" dirty="0">
               <a:solidFill>
                 <a:srgbClr val="0070C0"/>
               </a:solidFill>
@@ -5155,71 +5220,6 @@
                 </a:outerShdw>
               </a:effectLst>
             </a:endParaRPr>
-          </a:p>
-        </p:txBody>
-      </p:sp>
-      <p:sp>
-        <p:nvSpPr>
-          <p:cNvPr id="2" name="Espaço Reservado para Conteúdo 1"/>
-          <p:cNvSpPr>
-            <a:spLocks noGrp="1"/>
-          </p:cNvSpPr>
-          <p:nvPr>
-            <p:ph idx="1"/>
-          </p:nvPr>
-        </p:nvSpPr>
-        <p:spPr>
-          <a:xfrm>
-            <a:off x="457200" y="1143001"/>
-            <a:ext cx="8229600" cy="2358008"/>
-          </a:xfrm>
-        </p:spPr>
-        <p:style>
-          <a:lnRef idx="1">
-            <a:schemeClr val="accent3"/>
-          </a:lnRef>
-          <a:fillRef idx="2">
-            <a:schemeClr val="accent3"/>
-          </a:fillRef>
-          <a:effectRef idx="1">
-            <a:schemeClr val="accent3"/>
-          </a:effectRef>
-          <a:fontRef idx="minor">
-            <a:schemeClr val="dk1"/>
-          </a:fontRef>
-        </p:style>
-        <p:txBody>
-          <a:bodyPr>
-            <a:normAutofit/>
-          </a:bodyPr>
-          <a:lstStyle/>
-          <a:p>
-            <a:r>
-              <a:rPr lang="en-US" sz="2800" dirty="0" smtClean="0"/>
-              <a:t>Several models to find item metadata similarity</a:t>
-            </a:r>
-          </a:p>
-          <a:p>
-            <a:pPr lvl="1"/>
-            <a:r>
-              <a:rPr lang="en-US" sz="2400" dirty="0" smtClean="0"/>
-              <a:t>Vector Space Model, Term Frequency Inverse Document Frequency (TF/IDF)</a:t>
-            </a:r>
-          </a:p>
-          <a:p>
-            <a:pPr lvl="1"/>
-            <a:r>
-              <a:rPr lang="en-US" sz="2400" dirty="0" smtClean="0"/>
-              <a:t>Probabilistic models (Naïve </a:t>
-            </a:r>
-            <a:r>
-              <a:rPr lang="en-US" sz="2400" dirty="0" err="1" smtClean="0"/>
-              <a:t>Bayes</a:t>
-            </a:r>
-            <a:r>
-              <a:rPr lang="en-US" sz="2400" dirty="0" smtClean="0"/>
-              <a:t> Classifier, Decision Trees or Neural Networks)</a:t>
-            </a:r>
           </a:p>
         </p:txBody>
       </p:sp>
@@ -5301,87 +5301,53 @@
           </a:p>
         </p:txBody>
       </p:sp>
-      <p:sp>
-        <p:nvSpPr>
-          <p:cNvPr id="12" name="Espaço Reservado para Conteúdo 1"/>
-          <p:cNvSpPr txBox="1">
-            <a:spLocks/>
-          </p:cNvSpPr>
-          <p:nvPr/>
-        </p:nvSpPr>
-        <p:spPr>
+      <p:pic>
+        <p:nvPicPr>
+          <p:cNvPr id="2050" name="Picture 2" descr="https://d1sui4xqepm0ps.cloudfront.net/categories/example"/>
+          <p:cNvPicPr>
+            <a:picLocks noGrp="1" noChangeAspect="1" noChangeArrowheads="1"/>
+          </p:cNvPicPr>
+          <p:nvPr>
+            <p:ph idx="1"/>
+          </p:nvPr>
+        </p:nvPicPr>
+        <p:blipFill>
+          <a:blip r:embed="rId2">
+            <a:extLst>
+              <a:ext uri="{28A0092B-C50C-407E-A947-70E740481C1C}">
+                <a14:useLocalDpi xmlns:a14="http://schemas.microsoft.com/office/drawing/2010/main" val="0"/>
+              </a:ext>
+            </a:extLst>
+          </a:blip>
+          <a:srcRect/>
+          <a:stretch>
+            <a:fillRect/>
+          </a:stretch>
+        </p:blipFill>
+        <p:spPr bwMode="auto">
           <a:xfrm>
-            <a:off x="467544" y="3861048"/>
-            <a:ext cx="8229600" cy="2358008"/>
+            <a:off x="2540000" y="2612231"/>
+            <a:ext cx="4064000" cy="1968500"/>
           </a:xfrm>
           <a:prstGeom prst="rect">
             <a:avLst/>
           </a:prstGeom>
+          <a:noFill/>
+          <a:extLst>
+            <a:ext uri="{909E8E84-426E-40DD-AFC4-6F175D3DCCD1}">
+              <a14:hiddenFill xmlns:a14="http://schemas.microsoft.com/office/drawing/2010/main">
+                <a:solidFill>
+                  <a:srgbClr val="FFFFFF"/>
+                </a:solidFill>
+              </a14:hiddenFill>
+            </a:ext>
+          </a:extLst>
         </p:spPr>
-        <p:style>
-          <a:lnRef idx="1">
-            <a:schemeClr val="accent6"/>
-          </a:lnRef>
-          <a:fillRef idx="2">
-            <a:schemeClr val="accent6"/>
-          </a:fillRef>
-          <a:effectRef idx="1">
-            <a:schemeClr val="accent6"/>
-          </a:effectRef>
-          <a:fontRef idx="minor">
-            <a:schemeClr val="dk1"/>
-          </a:fontRef>
-        </p:style>
-        <p:txBody>
-          <a:bodyPr vert="horz" lIns="91440" tIns="45720" rIns="91440" bIns="45720" rtlCol="0">
-            <a:normAutofit lnSpcReduction="10000"/>
-          </a:bodyPr>
-          <a:lstStyle/>
-          <a:p>
-            <a:pPr marL="342900" lvl="0" indent="-342900">
-              <a:spcBef>
-                <a:spcPct val="20000"/>
-              </a:spcBef>
-              <a:buFont typeface="Arial" pitchFamily="34" charset="0"/>
-              <a:buChar char="•"/>
-            </a:pPr>
-            <a:r>
-              <a:rPr lang="en-US" sz="2800" dirty="0" smtClean="0"/>
-              <a:t>Strategy depends on items' metadata and how much their characteristics are refined (or hard to extract content)</a:t>
-            </a:r>
-          </a:p>
-          <a:p>
-            <a:pPr marL="342900" lvl="0" indent="-342900">
-              <a:spcBef>
-                <a:spcPct val="20000"/>
-              </a:spcBef>
-              <a:buFont typeface="Arial" pitchFamily="34" charset="0"/>
-              <a:buChar char="•"/>
-            </a:pPr>
-            <a:r>
-              <a:rPr lang="en-US" sz="2800" dirty="0" smtClean="0"/>
-              <a:t>Algorithm can become over specialized</a:t>
-            </a:r>
-          </a:p>
-          <a:p>
-            <a:pPr marL="342900" lvl="0" indent="-342900">
-              <a:spcBef>
-                <a:spcPct val="20000"/>
-              </a:spcBef>
-              <a:buFont typeface="Arial" pitchFamily="34" charset="0"/>
-              <a:buChar char="•"/>
-            </a:pPr>
-            <a:r>
-              <a:rPr lang="en-US" sz="2800" dirty="0" smtClean="0"/>
-              <a:t>Difficult to exploit quality judgment from users</a:t>
-            </a:r>
-          </a:p>
-        </p:txBody>
-      </p:sp>
+      </p:pic>
     </p:spTree>
     <p:extLst>
       <p:ext uri="{BB962C8B-B14F-4D97-AF65-F5344CB8AC3E}">
-        <p14:creationId xmlns:p14="http://schemas.microsoft.com/office/powerpoint/2010/main" val="2942898102"/>
+        <p14:creationId xmlns:p14="http://schemas.microsoft.com/office/powerpoint/2010/main" val="3792145510"/>
       </p:ext>
     </p:extLst>
   </p:cSld>
@@ -5423,32 +5389,6 @@
           <a:chExt cx="0" cy="0"/>
         </a:xfrm>
       </p:grpSpPr>
-      <p:pic>
-        <p:nvPicPr>
-          <p:cNvPr id="2050" name="Picture 2" descr="C:\Users\Nascimento\Documents\workspace-GitRepos\CAP392-02-PloP\artigos\03 - Pattern Language\entrega final\LIBRA recommender-systems-3-638.jpg"/>
-          <p:cNvPicPr>
-            <a:picLocks noChangeAspect="1" noChangeArrowheads="1"/>
-          </p:cNvPicPr>
-          <p:nvPr/>
-        </p:nvPicPr>
-        <p:blipFill>
-          <a:blip r:embed="rId3" cstate="print"/>
-          <a:srcRect/>
-          <a:stretch>
-            <a:fillRect/>
-          </a:stretch>
-        </p:blipFill>
-        <p:spPr bwMode="auto">
-          <a:xfrm>
-            <a:off x="5580112" y="1268760"/>
-            <a:ext cx="2822451" cy="2119050"/>
-          </a:xfrm>
-          <a:prstGeom prst="rect">
-            <a:avLst/>
-          </a:prstGeom>
-          <a:noFill/>
-        </p:spPr>
-      </p:pic>
       <p:sp>
         <p:nvSpPr>
           <p:cNvPr id="3" name="Slide Number Placeholder 2"/>
@@ -5470,126 +5410,6 @@
               <a:t>6</a:t>
             </a:fld>
             <a:endParaRPr lang="en-US" dirty="0"/>
-          </a:p>
-        </p:txBody>
-      </p:sp>
-      <p:sp>
-        <p:nvSpPr>
-          <p:cNvPr id="4" name="Title 3"/>
-          <p:cNvSpPr>
-            <a:spLocks noGrp="1"/>
-          </p:cNvSpPr>
-          <p:nvPr>
-            <p:ph type="title"/>
-          </p:nvPr>
-        </p:nvSpPr>
-        <p:spPr/>
-        <p:txBody>
-          <a:bodyPr>
-            <a:normAutofit/>
-          </a:bodyPr>
-          <a:lstStyle/>
-          <a:p>
-            <a:r>
-              <a:rPr lang="en-US" dirty="0" smtClean="0">
-                <a:solidFill>
-                  <a:srgbClr val="0070C0"/>
-                </a:solidFill>
-                <a:effectLst>
-                  <a:outerShdw blurRad="38100" dist="38100" dir="2700000" algn="tl">
-                    <a:srgbClr val="000000">
-                      <a:alpha val="43137"/>
-                    </a:srgbClr>
-                  </a:outerShdw>
-                </a:effectLst>
-              </a:rPr>
-              <a:t>Content-Based – Examples</a:t>
-            </a:r>
-            <a:endParaRPr lang="en-US" dirty="0">
-              <a:solidFill>
-                <a:srgbClr val="0070C0"/>
-              </a:solidFill>
-              <a:effectLst>
-                <a:outerShdw blurRad="38100" dist="38100" dir="2700000" algn="tl">
-                  <a:srgbClr val="000000">
-                    <a:alpha val="43137"/>
-                  </a:srgbClr>
-                </a:outerShdw>
-              </a:effectLst>
-            </a:endParaRPr>
-          </a:p>
-        </p:txBody>
-      </p:sp>
-      <p:sp>
-        <p:nvSpPr>
-          <p:cNvPr id="2" name="Espaço Reservado para Conteúdo 1"/>
-          <p:cNvSpPr>
-            <a:spLocks noGrp="1"/>
-          </p:cNvSpPr>
-          <p:nvPr>
-            <p:ph idx="1"/>
-          </p:nvPr>
-        </p:nvSpPr>
-        <p:spPr>
-          <a:xfrm>
-            <a:off x="457200" y="1143001"/>
-            <a:ext cx="5122912" cy="1421904"/>
-          </a:xfrm>
-          <a:ln/>
-        </p:spPr>
-        <p:style>
-          <a:lnRef idx="1">
-            <a:schemeClr val="accent5"/>
-          </a:lnRef>
-          <a:fillRef idx="2">
-            <a:schemeClr val="accent5"/>
-          </a:fillRef>
-          <a:effectRef idx="1">
-            <a:schemeClr val="accent5"/>
-          </a:effectRef>
-          <a:fontRef idx="minor">
-            <a:schemeClr val="dk1"/>
-          </a:fontRef>
-        </p:style>
-        <p:txBody>
-          <a:bodyPr>
-            <a:normAutofit/>
-          </a:bodyPr>
-          <a:lstStyle/>
-          <a:p>
-            <a:r>
-              <a:rPr lang="en-US" sz="2400" dirty="0" err="1" smtClean="0"/>
-              <a:t>Citeseer</a:t>
-            </a:r>
-            <a:r>
-              <a:rPr lang="en-US" sz="2400" dirty="0" smtClean="0"/>
-              <a:t>, LIBRA </a:t>
-            </a:r>
-            <a:r>
-              <a:rPr lang="en-US" sz="1050" dirty="0" smtClean="0"/>
-              <a:t>(Learning Intelligent Book Recommending Agent)</a:t>
-            </a:r>
-          </a:p>
-          <a:p>
-            <a:r>
-              <a:rPr lang="en-US" sz="2400" dirty="0" err="1" smtClean="0"/>
-              <a:t>RottenTomatoes</a:t>
-            </a:r>
-            <a:r>
-              <a:rPr lang="en-US" sz="2400" dirty="0" smtClean="0"/>
-              <a:t>, See this Next, Jinni</a:t>
-            </a:r>
-          </a:p>
-          <a:p>
-            <a:r>
-              <a:rPr lang="en-US" sz="2400" dirty="0" smtClean="0"/>
-              <a:t>Steam, </a:t>
-            </a:r>
-            <a:r>
-              <a:rPr lang="en-US" sz="2400" dirty="0" err="1" smtClean="0"/>
-              <a:t>boardgamesfor.me</a:t>
-            </a:r>
-            <a:endParaRPr lang="en-US" sz="2000" dirty="0" smtClean="0"/>
           </a:p>
         </p:txBody>
       </p:sp>
@@ -5673,14 +5493,14 @@
       </p:sp>
       <p:pic>
         <p:nvPicPr>
-          <p:cNvPr id="1027" name="Picture 3" descr="G:\HD-Games\GitRepos\DesignPatterns\CAP392-02-PloP\artigos\03 - Pattern Language\entrega final\CiteSeer.png"/>
+          <p:cNvPr id="4099" name="Picture 3"/>
           <p:cNvPicPr>
             <a:picLocks noChangeAspect="1" noChangeArrowheads="1"/>
           </p:cNvPicPr>
           <p:nvPr/>
         </p:nvPicPr>
         <p:blipFill>
-          <a:blip r:embed="rId4" cstate="print">
+          <a:blip r:embed="rId2">
             <a:extLst>
               <a:ext uri="{28A0092B-C50C-407E-A947-70E740481C1C}">
                 <a14:useLocalDpi xmlns:a14="http://schemas.microsoft.com/office/drawing/2010/main" val="0"/>
@@ -5694,199 +5514,98 @@
         </p:blipFill>
         <p:spPr bwMode="auto">
           <a:xfrm>
-            <a:off x="1043608" y="2708920"/>
-            <a:ext cx="2714625" cy="514350"/>
+            <a:off x="457200" y="1268760"/>
+            <a:ext cx="8229600" cy="5238750"/>
           </a:xfrm>
           <a:prstGeom prst="rect">
             <a:avLst/>
           </a:prstGeom>
           <a:noFill/>
+          <a:ln>
+            <a:noFill/>
+          </a:ln>
+          <a:effectLst/>
           <a:extLst>
             <a:ext uri="{909E8E84-426E-40DD-AFC4-6F175D3DCCD1}">
               <a14:hiddenFill xmlns:a14="http://schemas.microsoft.com/office/drawing/2010/main">
                 <a:solidFill>
-                  <a:srgbClr val="FFFFFF"/>
+                  <a:schemeClr val="accent1"/>
                 </a:solidFill>
               </a14:hiddenFill>
+            </a:ext>
+            <a:ext uri="{91240B29-F687-4F45-9708-019B960494DF}">
+              <a14:hiddenLine xmlns:a14="http://schemas.microsoft.com/office/drawing/2010/main" w="9525">
+                <a:solidFill>
+                  <a:schemeClr val="tx1"/>
+                </a:solidFill>
+                <a:miter lim="800000"/>
+                <a:headEnd/>
+                <a:tailEnd/>
+              </a14:hiddenLine>
+            </a:ext>
+            <a:ext uri="{AF507438-7753-43E0-B8FC-AC1667EBCBE1}">
+              <a14:hiddenEffects xmlns:a14="http://schemas.microsoft.com/office/drawing/2010/main">
+                <a:effectLst>
+                  <a:outerShdw dist="35921" dir="2700000" algn="ctr" rotWithShape="0">
+                    <a:schemeClr val="bg2"/>
+                  </a:outerShdw>
+                </a:effectLst>
+              </a14:hiddenEffects>
             </a:ext>
           </a:extLst>
         </p:spPr>
       </p:pic>
-      <p:pic>
-        <p:nvPicPr>
-          <p:cNvPr id="1028" name="Picture 4" descr="G:\HD-Games\GitRepos\DesignPatterns\CAP392-02-PloP\artigos\03 - Pattern Language\entrega final\seethisnext.jpg"/>
-          <p:cNvPicPr>
-            <a:picLocks noChangeAspect="1" noChangeArrowheads="1"/>
-          </p:cNvPicPr>
-          <p:nvPr/>
-        </p:nvPicPr>
-        <p:blipFill>
-          <a:blip r:embed="rId5" cstate="print">
-            <a:extLst>
-              <a:ext uri="{28A0092B-C50C-407E-A947-70E740481C1C}">
-                <a14:useLocalDpi xmlns:a14="http://schemas.microsoft.com/office/drawing/2010/main" val="0"/>
-              </a:ext>
-            </a:extLst>
-          </a:blip>
-          <a:srcRect/>
-          <a:stretch>
-            <a:fillRect/>
-          </a:stretch>
-        </p:blipFill>
-        <p:spPr bwMode="auto">
-          <a:xfrm>
-            <a:off x="3563888" y="3501008"/>
-            <a:ext cx="2664296" cy="507979"/>
-          </a:xfrm>
-          <a:prstGeom prst="rect">
-            <a:avLst/>
-          </a:prstGeom>
-          <a:noFill/>
-          <a:extLst>
-            <a:ext uri="{909E8E84-426E-40DD-AFC4-6F175D3DCCD1}">
-              <a14:hiddenFill xmlns:a14="http://schemas.microsoft.com/office/drawing/2010/main">
-                <a:solidFill>
-                  <a:srgbClr val="FFFFFF"/>
-                </a:solidFill>
-              </a14:hiddenFill>
-            </a:ext>
-          </a:extLst>
-        </p:spPr>
-      </p:pic>
-      <p:pic>
-        <p:nvPicPr>
-          <p:cNvPr id="6" name="Picture 2" descr="C:\Users\Nascimento\Documents\workspace-GitRepos\CAP392-02-PloP\artigos\03 - Pattern Language\entrega final\recommendedforme.png"/>
-          <p:cNvPicPr>
-            <a:picLocks noChangeAspect="1" noChangeArrowheads="1"/>
-          </p:cNvPicPr>
-          <p:nvPr/>
-        </p:nvPicPr>
-        <p:blipFill>
-          <a:blip r:embed="rId6" cstate="print"/>
-          <a:srcRect/>
-          <a:stretch>
-            <a:fillRect/>
-          </a:stretch>
-        </p:blipFill>
-        <p:spPr bwMode="auto">
-          <a:xfrm>
-            <a:off x="827584" y="4365104"/>
-            <a:ext cx="3933933" cy="2088232"/>
-          </a:xfrm>
-          <a:prstGeom prst="rect">
-            <a:avLst/>
-          </a:prstGeom>
-          <a:noFill/>
-        </p:spPr>
-      </p:pic>
-      <p:pic>
-        <p:nvPicPr>
-          <p:cNvPr id="8" name="Picture 3" descr="C:\Users\Nascimento\Documents\workspace-GitRepos\CAP392-02-PloP\artigos\03 - Pattern Language\entrega final\steam_logo.png"/>
-          <p:cNvPicPr>
-            <a:picLocks noChangeAspect="1" noChangeArrowheads="1"/>
-          </p:cNvPicPr>
-          <p:nvPr/>
-        </p:nvPicPr>
-        <p:blipFill>
-          <a:blip r:embed="rId7" cstate="print"/>
-          <a:srcRect/>
-          <a:stretch>
-            <a:fillRect/>
-          </a:stretch>
-        </p:blipFill>
-        <p:spPr bwMode="auto">
-          <a:xfrm>
-            <a:off x="4067944" y="4273804"/>
-            <a:ext cx="864096" cy="864096"/>
-          </a:xfrm>
-          <a:prstGeom prst="rect">
-            <a:avLst/>
-          </a:prstGeom>
-          <a:noFill/>
-        </p:spPr>
-      </p:pic>
-      <p:pic>
-        <p:nvPicPr>
-          <p:cNvPr id="9" name="Picture 4" descr="C:\Users\Nascimento\Documents\workspace-GitRepos\CAP392-02-PloP\artigos\03 - Pattern Language\entrega final\boardgamesfor.me.png"/>
-          <p:cNvPicPr>
-            <a:picLocks noChangeAspect="1" noChangeArrowheads="1"/>
-          </p:cNvPicPr>
-          <p:nvPr/>
-        </p:nvPicPr>
-        <p:blipFill>
-          <a:blip r:embed="rId8" cstate="print"/>
-          <a:srcRect/>
-          <a:stretch>
-            <a:fillRect/>
-          </a:stretch>
-        </p:blipFill>
-        <p:spPr bwMode="auto">
-          <a:xfrm>
-            <a:off x="5796136" y="4931973"/>
-            <a:ext cx="2160240" cy="517558"/>
-          </a:xfrm>
-          <a:prstGeom prst="rect">
-            <a:avLst/>
-          </a:prstGeom>
-          <a:noFill/>
-        </p:spPr>
-      </p:pic>
-      <p:pic>
-        <p:nvPicPr>
-          <p:cNvPr id="1031" name="Picture 7" descr="C:\Users\Nascimento\Documents\workspace-GitRepos\CAP392-02-PloP\artigos\03 - Pattern Language\entrega final\Imagens Geral\300px-Rt-logo.svg.png"/>
-          <p:cNvPicPr>
-            <a:picLocks noChangeAspect="1" noChangeArrowheads="1"/>
-          </p:cNvPicPr>
-          <p:nvPr/>
-        </p:nvPicPr>
-        <p:blipFill>
-          <a:blip r:embed="rId9" cstate="print"/>
-          <a:srcRect/>
-          <a:stretch>
-            <a:fillRect/>
-          </a:stretch>
-        </p:blipFill>
-        <p:spPr bwMode="auto">
-          <a:xfrm>
-            <a:off x="755576" y="3356992"/>
-            <a:ext cx="2592288" cy="829532"/>
-          </a:xfrm>
-          <a:prstGeom prst="rect">
-            <a:avLst/>
-          </a:prstGeom>
-          <a:noFill/>
-        </p:spPr>
-      </p:pic>
-      <p:pic>
-        <p:nvPicPr>
-          <p:cNvPr id="1033" name="Picture 9" descr="C:\Users\Nascimento\Documents\workspace-GitRepos\CAP392-02-PloP\artigos\03 - Pattern Language\entrega final\Imagens Geral\jinniLogo-300x121.jpg"/>
-          <p:cNvPicPr>
-            <a:picLocks noChangeAspect="1" noChangeArrowheads="1"/>
-          </p:cNvPicPr>
-          <p:nvPr/>
-        </p:nvPicPr>
-        <p:blipFill>
-          <a:blip r:embed="rId10" cstate="print"/>
-          <a:srcRect/>
-          <a:stretch>
-            <a:fillRect/>
-          </a:stretch>
-        </p:blipFill>
-        <p:spPr bwMode="auto">
-          <a:xfrm>
-            <a:off x="6444208" y="3573016"/>
-            <a:ext cx="1979712" cy="798484"/>
-          </a:xfrm>
-          <a:prstGeom prst="rect">
-            <a:avLst/>
-          </a:prstGeom>
-          <a:noFill/>
-        </p:spPr>
-      </p:pic>
+      <p:sp>
+        <p:nvSpPr>
+          <p:cNvPr id="13" name="Title 3"/>
+          <p:cNvSpPr>
+            <a:spLocks noGrp="1"/>
+          </p:cNvSpPr>
+          <p:nvPr>
+            <p:ph type="title"/>
+          </p:nvPr>
+        </p:nvSpPr>
+        <p:spPr/>
+        <p:txBody>
+          <a:bodyPr>
+            <a:normAutofit/>
+          </a:bodyPr>
+          <a:lstStyle/>
+          <a:p>
+            <a:r>
+              <a:rPr lang="pt-BR" dirty="0" smtClean="0">
+                <a:solidFill>
+                  <a:srgbClr val="0070C0"/>
+                </a:solidFill>
+                <a:effectLst>
+                  <a:outerShdw blurRad="38100" dist="38100" dir="2700000" algn="tl">
+                    <a:srgbClr val="000000">
+                      <a:alpha val="43137"/>
+                    </a:srgbClr>
+                  </a:outerShdw>
+                </a:effectLst>
+              </a:rPr>
+              <a:t>Exemplo - Função</a:t>
+            </a:r>
+            <a:endParaRPr lang="pt-BR" dirty="0">
+              <a:solidFill>
+                <a:srgbClr val="0070C0"/>
+              </a:solidFill>
+              <a:effectLst>
+                <a:outerShdw blurRad="38100" dist="38100" dir="2700000" algn="tl">
+                  <a:srgbClr val="000000">
+                    <a:alpha val="43137"/>
+                  </a:srgbClr>
+                </a:outerShdw>
+              </a:effectLst>
+            </a:endParaRPr>
+          </a:p>
+        </p:txBody>
+      </p:sp>
     </p:spTree>
     <p:extLst>
       <p:ext uri="{BB962C8B-B14F-4D97-AF65-F5344CB8AC3E}">
-        <p14:creationId xmlns:p14="http://schemas.microsoft.com/office/powerpoint/2010/main" val="2942898102"/>
+        <p14:creationId xmlns:p14="http://schemas.microsoft.com/office/powerpoint/2010/main" val="3659421261"/>
       </p:ext>
     </p:extLst>
   </p:cSld>
@@ -5905,6 +5624,1060 @@
     <p:tnLst>
       <p:par>
         <p:cTn id="1" dur="indefinite" restart="never" nodeType="tmRoot"/>
+      </p:par>
+    </p:tnLst>
+  </p:timing>
+</p:sld>
+</file>
+
+<file path=ppt/slides/slide7.xml><?xml version="1.0" encoding="utf-8"?>
+<p:sld xmlns:a="http://schemas.openxmlformats.org/drawingml/2006/main" xmlns:r="http://schemas.openxmlformats.org/officeDocument/2006/relationships" xmlns:p="http://schemas.openxmlformats.org/presentationml/2006/main">
+  <p:cSld>
+    <p:spTree>
+      <p:nvGrpSpPr>
+        <p:cNvPr id="1" name=""/>
+        <p:cNvGrpSpPr/>
+        <p:nvPr/>
+      </p:nvGrpSpPr>
+      <p:grpSpPr>
+        <a:xfrm>
+          <a:off x="0" y="0"/>
+          <a:ext cx="0" cy="0"/>
+          <a:chOff x="0" y="0"/>
+          <a:chExt cx="0" cy="0"/>
+        </a:xfrm>
+      </p:grpSpPr>
+      <p:sp>
+        <p:nvSpPr>
+          <p:cNvPr id="3" name="Slide Number Placeholder 2"/>
+          <p:cNvSpPr>
+            <a:spLocks noGrp="1"/>
+          </p:cNvSpPr>
+          <p:nvPr>
+            <p:ph type="sldNum" sz="quarter" idx="11"/>
+          </p:nvPr>
+        </p:nvSpPr>
+        <p:spPr/>
+        <p:txBody>
+          <a:bodyPr/>
+          <a:lstStyle/>
+          <a:p>
+            <a:fld id="{338BD863-DCDC-5F43-A029-265BB7DA4A17}" type="slidenum">
+              <a:rPr lang="en-US" smtClean="0"/>
+              <a:pPr/>
+              <a:t>7</a:t>
+            </a:fld>
+            <a:endParaRPr lang="en-US" dirty="0"/>
+          </a:p>
+        </p:txBody>
+      </p:sp>
+      <p:sp>
+        <p:nvSpPr>
+          <p:cNvPr id="5" name="AutoShape 2" descr="G:\HD-Games\GitRepos\DesignPatterns\CAP392-02-PloP\artigos\03 - Pattern Language\entrega final\family-guy-simpsons2.webp"/>
+          <p:cNvSpPr>
+            <a:spLocks noChangeAspect="1" noChangeArrowheads="1"/>
+          </p:cNvSpPr>
+          <p:nvPr/>
+        </p:nvSpPr>
+        <p:spPr bwMode="auto">
+          <a:xfrm>
+            <a:off x="155575" y="-144463"/>
+            <a:ext cx="304800" cy="304801"/>
+          </a:xfrm>
+          <a:prstGeom prst="rect">
+            <a:avLst/>
+          </a:prstGeom>
+          <a:noFill/>
+          <a:extLst>
+            <a:ext uri="{909E8E84-426E-40DD-AFC4-6F175D3DCCD1}">
+              <a14:hiddenFill xmlns:a14="http://schemas.microsoft.com/office/drawing/2010/main">
+                <a:solidFill>
+                  <a:srgbClr val="FFFFFF"/>
+                </a:solidFill>
+              </a14:hiddenFill>
+            </a:ext>
+          </a:extLst>
+        </p:spPr>
+        <p:txBody>
+          <a:bodyPr vert="horz" wrap="square" lIns="91440" tIns="45720" rIns="91440" bIns="45720" numCol="1" anchor="t" anchorCtr="0" compatLnSpc="1">
+            <a:prstTxWarp prst="textNoShape">
+              <a:avLst/>
+            </a:prstTxWarp>
+          </a:bodyPr>
+          <a:lstStyle/>
+          <a:p>
+            <a:endParaRPr lang="pt-BR"/>
+          </a:p>
+        </p:txBody>
+      </p:sp>
+      <p:sp>
+        <p:nvSpPr>
+          <p:cNvPr id="7" name="AutoShape 4" descr="G:\HD-Games\GitRepos\DesignPatterns\CAP392-02-PloP\artigos\03 - Pattern Language\entrega final\family-guy-simpsons2.webp"/>
+          <p:cNvSpPr>
+            <a:spLocks noChangeAspect="1" noChangeArrowheads="1"/>
+          </p:cNvSpPr>
+          <p:nvPr/>
+        </p:nvSpPr>
+        <p:spPr bwMode="auto">
+          <a:xfrm>
+            <a:off x="307975" y="7937"/>
+            <a:ext cx="304800" cy="304801"/>
+          </a:xfrm>
+          <a:prstGeom prst="rect">
+            <a:avLst/>
+          </a:prstGeom>
+          <a:noFill/>
+          <a:extLst>
+            <a:ext uri="{909E8E84-426E-40DD-AFC4-6F175D3DCCD1}">
+              <a14:hiddenFill xmlns:a14="http://schemas.microsoft.com/office/drawing/2010/main">
+                <a:solidFill>
+                  <a:srgbClr val="FFFFFF"/>
+                </a:solidFill>
+              </a14:hiddenFill>
+            </a:ext>
+          </a:extLst>
+        </p:spPr>
+        <p:txBody>
+          <a:bodyPr vert="horz" wrap="square" lIns="91440" tIns="45720" rIns="91440" bIns="45720" numCol="1" anchor="t" anchorCtr="0" compatLnSpc="1">
+            <a:prstTxWarp prst="textNoShape">
+              <a:avLst/>
+            </a:prstTxWarp>
+          </a:bodyPr>
+          <a:lstStyle/>
+          <a:p>
+            <a:endParaRPr lang="pt-BR"/>
+          </a:p>
+        </p:txBody>
+      </p:sp>
+      <p:sp>
+        <p:nvSpPr>
+          <p:cNvPr id="13" name="Title 3"/>
+          <p:cNvSpPr>
+            <a:spLocks noGrp="1"/>
+          </p:cNvSpPr>
+          <p:nvPr>
+            <p:ph type="title"/>
+          </p:nvPr>
+        </p:nvSpPr>
+        <p:spPr/>
+        <p:txBody>
+          <a:bodyPr>
+            <a:normAutofit/>
+          </a:bodyPr>
+          <a:lstStyle/>
+          <a:p>
+            <a:r>
+              <a:rPr lang="pt-BR" dirty="0" smtClean="0">
+                <a:solidFill>
+                  <a:srgbClr val="0070C0"/>
+                </a:solidFill>
+                <a:effectLst>
+                  <a:outerShdw blurRad="38100" dist="38100" dir="2700000" algn="tl">
+                    <a:srgbClr val="000000">
+                      <a:alpha val="43137"/>
+                    </a:srgbClr>
+                  </a:outerShdw>
+                </a:effectLst>
+              </a:rPr>
+              <a:t>Exemplo – Função (Código Teste1)</a:t>
+            </a:r>
+            <a:endParaRPr lang="pt-BR" dirty="0">
+              <a:solidFill>
+                <a:srgbClr val="0070C0"/>
+              </a:solidFill>
+              <a:effectLst>
+                <a:outerShdw blurRad="38100" dist="38100" dir="2700000" algn="tl">
+                  <a:srgbClr val="000000">
+                    <a:alpha val="43137"/>
+                  </a:srgbClr>
+                </a:outerShdw>
+              </a:effectLst>
+            </a:endParaRPr>
+          </a:p>
+        </p:txBody>
+      </p:sp>
+      <p:pic>
+        <p:nvPicPr>
+          <p:cNvPr id="5123" name="Picture 3"/>
+          <p:cNvPicPr>
+            <a:picLocks noChangeAspect="1" noChangeArrowheads="1"/>
+          </p:cNvPicPr>
+          <p:nvPr/>
+        </p:nvPicPr>
+        <p:blipFill>
+          <a:blip r:embed="rId2">
+            <a:extLst>
+              <a:ext uri="{28A0092B-C50C-407E-A947-70E740481C1C}">
+                <a14:useLocalDpi xmlns:a14="http://schemas.microsoft.com/office/drawing/2010/main" val="0"/>
+              </a:ext>
+            </a:extLst>
+          </a:blip>
+          <a:srcRect/>
+          <a:stretch>
+            <a:fillRect/>
+          </a:stretch>
+        </p:blipFill>
+        <p:spPr bwMode="auto">
+          <a:xfrm>
+            <a:off x="321645" y="1124744"/>
+            <a:ext cx="8210550" cy="3990975"/>
+          </a:xfrm>
+          <a:prstGeom prst="rect">
+            <a:avLst/>
+          </a:prstGeom>
+          <a:noFill/>
+          <a:ln>
+            <a:noFill/>
+          </a:ln>
+          <a:effectLst/>
+          <a:extLst>
+            <a:ext uri="{909E8E84-426E-40DD-AFC4-6F175D3DCCD1}">
+              <a14:hiddenFill xmlns:a14="http://schemas.microsoft.com/office/drawing/2010/main">
+                <a:solidFill>
+                  <a:schemeClr val="accent1"/>
+                </a:solidFill>
+              </a14:hiddenFill>
+            </a:ext>
+            <a:ext uri="{91240B29-F687-4F45-9708-019B960494DF}">
+              <a14:hiddenLine xmlns:a14="http://schemas.microsoft.com/office/drawing/2010/main" w="9525">
+                <a:solidFill>
+                  <a:schemeClr val="tx1"/>
+                </a:solidFill>
+                <a:miter lim="800000"/>
+                <a:headEnd/>
+                <a:tailEnd/>
+              </a14:hiddenLine>
+            </a:ext>
+            <a:ext uri="{AF507438-7753-43E0-B8FC-AC1667EBCBE1}">
+              <a14:hiddenEffects xmlns:a14="http://schemas.microsoft.com/office/drawing/2010/main">
+                <a:effectLst>
+                  <a:outerShdw dist="35921" dir="2700000" algn="ctr" rotWithShape="0">
+                    <a:schemeClr val="bg2"/>
+                  </a:outerShdw>
+                </a:effectLst>
+              </a14:hiddenEffects>
+            </a:ext>
+          </a:extLst>
+        </p:spPr>
+      </p:pic>
+      <p:pic>
+        <p:nvPicPr>
+          <p:cNvPr id="5124" name="Picture 4"/>
+          <p:cNvPicPr>
+            <a:picLocks noChangeAspect="1" noChangeArrowheads="1"/>
+          </p:cNvPicPr>
+          <p:nvPr/>
+        </p:nvPicPr>
+        <p:blipFill>
+          <a:blip r:embed="rId3">
+            <a:extLst>
+              <a:ext uri="{28A0092B-C50C-407E-A947-70E740481C1C}">
+                <a14:useLocalDpi xmlns:a14="http://schemas.microsoft.com/office/drawing/2010/main" val="0"/>
+              </a:ext>
+            </a:extLst>
+          </a:blip>
+          <a:srcRect/>
+          <a:stretch>
+            <a:fillRect/>
+          </a:stretch>
+        </p:blipFill>
+        <p:spPr bwMode="auto">
+          <a:xfrm>
+            <a:off x="647071" y="2276872"/>
+            <a:ext cx="8210550" cy="4000500"/>
+          </a:xfrm>
+          <a:prstGeom prst="rect">
+            <a:avLst/>
+          </a:prstGeom>
+          <a:noFill/>
+          <a:ln>
+            <a:noFill/>
+          </a:ln>
+          <a:effectLst/>
+          <a:extLst>
+            <a:ext uri="{909E8E84-426E-40DD-AFC4-6F175D3DCCD1}">
+              <a14:hiddenFill xmlns:a14="http://schemas.microsoft.com/office/drawing/2010/main">
+                <a:solidFill>
+                  <a:schemeClr val="accent1"/>
+                </a:solidFill>
+              </a14:hiddenFill>
+            </a:ext>
+            <a:ext uri="{91240B29-F687-4F45-9708-019B960494DF}">
+              <a14:hiddenLine xmlns:a14="http://schemas.microsoft.com/office/drawing/2010/main" w="9525">
+                <a:solidFill>
+                  <a:schemeClr val="tx1"/>
+                </a:solidFill>
+                <a:miter lim="800000"/>
+                <a:headEnd/>
+                <a:tailEnd/>
+              </a14:hiddenLine>
+            </a:ext>
+            <a:ext uri="{AF507438-7753-43E0-B8FC-AC1667EBCBE1}">
+              <a14:hiddenEffects xmlns:a14="http://schemas.microsoft.com/office/drawing/2010/main">
+                <a:effectLst>
+                  <a:outerShdw dist="35921" dir="2700000" algn="ctr" rotWithShape="0">
+                    <a:schemeClr val="bg2"/>
+                  </a:outerShdw>
+                </a:effectLst>
+              </a14:hiddenEffects>
+            </a:ext>
+          </a:extLst>
+        </p:spPr>
+      </p:pic>
+    </p:spTree>
+    <p:extLst>
+      <p:ext uri="{BB962C8B-B14F-4D97-AF65-F5344CB8AC3E}">
+        <p14:creationId xmlns:p14="http://schemas.microsoft.com/office/powerpoint/2010/main" val="3372461043"/>
+      </p:ext>
+    </p:extLst>
+  </p:cSld>
+  <p:clrMapOvr>
+    <a:masterClrMapping/>
+  </p:clrMapOvr>
+  <mc:AlternateContent xmlns:mc="http://schemas.openxmlformats.org/markup-compatibility/2006">
+    <mc:Choice xmlns:p14="http://schemas.microsoft.com/office/powerpoint/2010/main" Requires="p14">
+      <p:transition p14:dur="10"/>
+    </mc:Choice>
+    <mc:Fallback>
+      <p:transition/>
+    </mc:Fallback>
+  </mc:AlternateContent>
+  <p:timing>
+    <p:tnLst>
+      <p:par>
+        <p:cTn id="1" dur="indefinite" restart="never" nodeType="tmRoot">
+          <p:childTnLst>
+            <p:seq concurrent="1" nextAc="seek">
+              <p:cTn id="2" dur="indefinite" nodeType="mainSeq">
+                <p:childTnLst>
+                  <p:par>
+                    <p:cTn id="3" fill="hold">
+                      <p:stCondLst>
+                        <p:cond delay="indefinite"/>
+                      </p:stCondLst>
+                      <p:childTnLst>
+                        <p:par>
+                          <p:cTn id="4" fill="hold">
+                            <p:stCondLst>
+                              <p:cond delay="0"/>
+                            </p:stCondLst>
+                            <p:childTnLst>
+                              <p:par>
+                                <p:cTn id="5" presetID="22" presetClass="entr" presetSubtype="1" fill="hold" nodeType="clickEffect">
+                                  <p:stCondLst>
+                                    <p:cond delay="0"/>
+                                  </p:stCondLst>
+                                  <p:childTnLst>
+                                    <p:set>
+                                      <p:cBhvr>
+                                        <p:cTn id="6" dur="1" fill="hold">
+                                          <p:stCondLst>
+                                            <p:cond delay="0"/>
+                                          </p:stCondLst>
+                                        </p:cTn>
+                                        <p:tgtEl>
+                                          <p:spTgt spid="5124"/>
+                                        </p:tgtEl>
+                                        <p:attrNameLst>
+                                          <p:attrName>style.visibility</p:attrName>
+                                        </p:attrNameLst>
+                                      </p:cBhvr>
+                                      <p:to>
+                                        <p:strVal val="visible"/>
+                                      </p:to>
+                                    </p:set>
+                                    <p:animEffect transition="in" filter="wipe(up)">
+                                      <p:cBhvr>
+                                        <p:cTn id="7" dur="500"/>
+                                        <p:tgtEl>
+                                          <p:spTgt spid="5124"/>
+                                        </p:tgtEl>
+                                      </p:cBhvr>
+                                    </p:animEffect>
+                                  </p:childTnLst>
+                                </p:cTn>
+                              </p:par>
+                            </p:childTnLst>
+                          </p:cTn>
+                        </p:par>
+                      </p:childTnLst>
+                    </p:cTn>
+                  </p:par>
+                </p:childTnLst>
+              </p:cTn>
+              <p:prevCondLst>
+                <p:cond evt="onPrev" delay="0">
+                  <p:tgtEl>
+                    <p:sldTgt/>
+                  </p:tgtEl>
+                </p:cond>
+              </p:prevCondLst>
+              <p:nextCondLst>
+                <p:cond evt="onNext" delay="0">
+                  <p:tgtEl>
+                    <p:sldTgt/>
+                  </p:tgtEl>
+                </p:cond>
+              </p:nextCondLst>
+            </p:seq>
+          </p:childTnLst>
+        </p:cTn>
+      </p:par>
+    </p:tnLst>
+  </p:timing>
+</p:sld>
+</file>
+
+<file path=ppt/slides/slide8.xml><?xml version="1.0" encoding="utf-8"?>
+<p:sld xmlns:a="http://schemas.openxmlformats.org/drawingml/2006/main" xmlns:r="http://schemas.openxmlformats.org/officeDocument/2006/relationships" xmlns:p="http://schemas.openxmlformats.org/presentationml/2006/main">
+  <p:cSld>
+    <p:spTree>
+      <p:nvGrpSpPr>
+        <p:cNvPr id="1" name=""/>
+        <p:cNvGrpSpPr/>
+        <p:nvPr/>
+      </p:nvGrpSpPr>
+      <p:grpSpPr>
+        <a:xfrm>
+          <a:off x="0" y="0"/>
+          <a:ext cx="0" cy="0"/>
+          <a:chOff x="0" y="0"/>
+          <a:chExt cx="0" cy="0"/>
+        </a:xfrm>
+      </p:grpSpPr>
+      <p:sp>
+        <p:nvSpPr>
+          <p:cNvPr id="3" name="Slide Number Placeholder 2"/>
+          <p:cNvSpPr>
+            <a:spLocks noGrp="1"/>
+          </p:cNvSpPr>
+          <p:nvPr>
+            <p:ph type="sldNum" sz="quarter" idx="11"/>
+          </p:nvPr>
+        </p:nvSpPr>
+        <p:spPr/>
+        <p:txBody>
+          <a:bodyPr/>
+          <a:lstStyle/>
+          <a:p>
+            <a:fld id="{338BD863-DCDC-5F43-A029-265BB7DA4A17}" type="slidenum">
+              <a:rPr lang="en-US" smtClean="0"/>
+              <a:pPr/>
+              <a:t>8</a:t>
+            </a:fld>
+            <a:endParaRPr lang="en-US" dirty="0"/>
+          </a:p>
+        </p:txBody>
+      </p:sp>
+      <p:sp>
+        <p:nvSpPr>
+          <p:cNvPr id="5" name="AutoShape 2" descr="G:\HD-Games\GitRepos\DesignPatterns\CAP392-02-PloP\artigos\03 - Pattern Language\entrega final\family-guy-simpsons2.webp"/>
+          <p:cNvSpPr>
+            <a:spLocks noChangeAspect="1" noChangeArrowheads="1"/>
+          </p:cNvSpPr>
+          <p:nvPr/>
+        </p:nvSpPr>
+        <p:spPr bwMode="auto">
+          <a:xfrm>
+            <a:off x="155575" y="-144463"/>
+            <a:ext cx="304800" cy="304801"/>
+          </a:xfrm>
+          <a:prstGeom prst="rect">
+            <a:avLst/>
+          </a:prstGeom>
+          <a:noFill/>
+          <a:extLst>
+            <a:ext uri="{909E8E84-426E-40DD-AFC4-6F175D3DCCD1}">
+              <a14:hiddenFill xmlns:a14="http://schemas.microsoft.com/office/drawing/2010/main">
+                <a:solidFill>
+                  <a:srgbClr val="FFFFFF"/>
+                </a:solidFill>
+              </a14:hiddenFill>
+            </a:ext>
+          </a:extLst>
+        </p:spPr>
+        <p:txBody>
+          <a:bodyPr vert="horz" wrap="square" lIns="91440" tIns="45720" rIns="91440" bIns="45720" numCol="1" anchor="t" anchorCtr="0" compatLnSpc="1">
+            <a:prstTxWarp prst="textNoShape">
+              <a:avLst/>
+            </a:prstTxWarp>
+          </a:bodyPr>
+          <a:lstStyle/>
+          <a:p>
+            <a:endParaRPr lang="pt-BR"/>
+          </a:p>
+        </p:txBody>
+      </p:sp>
+      <p:sp>
+        <p:nvSpPr>
+          <p:cNvPr id="7" name="AutoShape 4" descr="G:\HD-Games\GitRepos\DesignPatterns\CAP392-02-PloP\artigos\03 - Pattern Language\entrega final\family-guy-simpsons2.webp"/>
+          <p:cNvSpPr>
+            <a:spLocks noChangeAspect="1" noChangeArrowheads="1"/>
+          </p:cNvSpPr>
+          <p:nvPr/>
+        </p:nvSpPr>
+        <p:spPr bwMode="auto">
+          <a:xfrm>
+            <a:off x="307975" y="7937"/>
+            <a:ext cx="304800" cy="304801"/>
+          </a:xfrm>
+          <a:prstGeom prst="rect">
+            <a:avLst/>
+          </a:prstGeom>
+          <a:noFill/>
+          <a:extLst>
+            <a:ext uri="{909E8E84-426E-40DD-AFC4-6F175D3DCCD1}">
+              <a14:hiddenFill xmlns:a14="http://schemas.microsoft.com/office/drawing/2010/main">
+                <a:solidFill>
+                  <a:srgbClr val="FFFFFF"/>
+                </a:solidFill>
+              </a14:hiddenFill>
+            </a:ext>
+          </a:extLst>
+        </p:spPr>
+        <p:txBody>
+          <a:bodyPr vert="horz" wrap="square" lIns="91440" tIns="45720" rIns="91440" bIns="45720" numCol="1" anchor="t" anchorCtr="0" compatLnSpc="1">
+            <a:prstTxWarp prst="textNoShape">
+              <a:avLst/>
+            </a:prstTxWarp>
+          </a:bodyPr>
+          <a:lstStyle/>
+          <a:p>
+            <a:endParaRPr lang="pt-BR"/>
+          </a:p>
+        </p:txBody>
+      </p:sp>
+      <p:sp>
+        <p:nvSpPr>
+          <p:cNvPr id="13" name="Title 3"/>
+          <p:cNvSpPr>
+            <a:spLocks noGrp="1"/>
+          </p:cNvSpPr>
+          <p:nvPr>
+            <p:ph type="title"/>
+          </p:nvPr>
+        </p:nvSpPr>
+        <p:spPr/>
+        <p:txBody>
+          <a:bodyPr>
+            <a:normAutofit/>
+          </a:bodyPr>
+          <a:lstStyle/>
+          <a:p>
+            <a:r>
+              <a:rPr lang="pt-BR" dirty="0" smtClean="0">
+                <a:solidFill>
+                  <a:srgbClr val="0070C0"/>
+                </a:solidFill>
+                <a:effectLst>
+                  <a:outerShdw blurRad="38100" dist="38100" dir="2700000" algn="tl">
+                    <a:srgbClr val="000000">
+                      <a:alpha val="43137"/>
+                    </a:srgbClr>
+                  </a:outerShdw>
+                </a:effectLst>
+              </a:rPr>
+              <a:t>Exemplo – Função (Resultados)</a:t>
+            </a:r>
+            <a:endParaRPr lang="pt-BR" dirty="0">
+              <a:solidFill>
+                <a:srgbClr val="0070C0"/>
+              </a:solidFill>
+              <a:effectLst>
+                <a:outerShdw blurRad="38100" dist="38100" dir="2700000" algn="tl">
+                  <a:srgbClr val="000000">
+                    <a:alpha val="43137"/>
+                  </a:srgbClr>
+                </a:outerShdw>
+              </a:effectLst>
+            </a:endParaRPr>
+          </a:p>
+        </p:txBody>
+      </p:sp>
+      <p:pic>
+        <p:nvPicPr>
+          <p:cNvPr id="6146" name="Picture 2"/>
+          <p:cNvPicPr>
+            <a:picLocks noChangeAspect="1" noChangeArrowheads="1"/>
+          </p:cNvPicPr>
+          <p:nvPr/>
+        </p:nvPicPr>
+        <p:blipFill>
+          <a:blip r:embed="rId2">
+            <a:extLst>
+              <a:ext uri="{28A0092B-C50C-407E-A947-70E740481C1C}">
+                <a14:useLocalDpi xmlns:a14="http://schemas.microsoft.com/office/drawing/2010/main" val="0"/>
+              </a:ext>
+            </a:extLst>
+          </a:blip>
+          <a:srcRect/>
+          <a:stretch>
+            <a:fillRect/>
+          </a:stretch>
+        </p:blipFill>
+        <p:spPr bwMode="auto">
+          <a:xfrm>
+            <a:off x="1259632" y="1099370"/>
+            <a:ext cx="6976070" cy="5613303"/>
+          </a:xfrm>
+          <a:prstGeom prst="rect">
+            <a:avLst/>
+          </a:prstGeom>
+          <a:noFill/>
+          <a:ln>
+            <a:noFill/>
+          </a:ln>
+          <a:effectLst/>
+          <a:extLst>
+            <a:ext uri="{909E8E84-426E-40DD-AFC4-6F175D3DCCD1}">
+              <a14:hiddenFill xmlns:a14="http://schemas.microsoft.com/office/drawing/2010/main">
+                <a:solidFill>
+                  <a:schemeClr val="accent1"/>
+                </a:solidFill>
+              </a14:hiddenFill>
+            </a:ext>
+            <a:ext uri="{91240B29-F687-4F45-9708-019B960494DF}">
+              <a14:hiddenLine xmlns:a14="http://schemas.microsoft.com/office/drawing/2010/main" w="9525">
+                <a:solidFill>
+                  <a:schemeClr val="tx1"/>
+                </a:solidFill>
+                <a:miter lim="800000"/>
+                <a:headEnd/>
+                <a:tailEnd/>
+              </a14:hiddenLine>
+            </a:ext>
+            <a:ext uri="{AF507438-7753-43E0-B8FC-AC1667EBCBE1}">
+              <a14:hiddenEffects xmlns:a14="http://schemas.microsoft.com/office/drawing/2010/main">
+                <a:effectLst>
+                  <a:outerShdw dist="35921" dir="2700000" algn="ctr" rotWithShape="0">
+                    <a:schemeClr val="bg2"/>
+                  </a:outerShdw>
+                </a:effectLst>
+              </a14:hiddenEffects>
+            </a:ext>
+          </a:extLst>
+        </p:spPr>
+      </p:pic>
+    </p:spTree>
+    <p:extLst>
+      <p:ext uri="{BB962C8B-B14F-4D97-AF65-F5344CB8AC3E}">
+        <p14:creationId xmlns:p14="http://schemas.microsoft.com/office/powerpoint/2010/main" val="1999292767"/>
+      </p:ext>
+    </p:extLst>
+  </p:cSld>
+  <p:clrMapOvr>
+    <a:masterClrMapping/>
+  </p:clrMapOvr>
+  <mc:AlternateContent xmlns:mc="http://schemas.openxmlformats.org/markup-compatibility/2006" xmlns:p14="http://schemas.microsoft.com/office/powerpoint/2010/main">
+    <mc:Choice Requires="p14">
+      <p:transition p14:dur="0"/>
+    </mc:Choice>
+    <mc:Fallback xmlns="">
+      <p:transition/>
+    </mc:Fallback>
+  </mc:AlternateContent>
+  <p:timing>
+    <p:tnLst>
+      <p:par>
+        <p:cTn id="1" dur="indefinite" restart="never" nodeType="tmRoot"/>
+      </p:par>
+    </p:tnLst>
+  </p:timing>
+</p:sld>
+</file>
+
+<file path=ppt/slides/slide9.xml><?xml version="1.0" encoding="utf-8"?>
+<p:sld xmlns:a="http://schemas.openxmlformats.org/drawingml/2006/main" xmlns:r="http://schemas.openxmlformats.org/officeDocument/2006/relationships" xmlns:p="http://schemas.openxmlformats.org/presentationml/2006/main">
+  <p:cSld>
+    <p:spTree>
+      <p:nvGrpSpPr>
+        <p:cNvPr id="1" name=""/>
+        <p:cNvGrpSpPr/>
+        <p:nvPr/>
+      </p:nvGrpSpPr>
+      <p:grpSpPr>
+        <a:xfrm>
+          <a:off x="0" y="0"/>
+          <a:ext cx="0" cy="0"/>
+          <a:chOff x="0" y="0"/>
+          <a:chExt cx="0" cy="0"/>
+        </a:xfrm>
+      </p:grpSpPr>
+      <p:sp>
+        <p:nvSpPr>
+          <p:cNvPr id="3" name="Slide Number Placeholder 2"/>
+          <p:cNvSpPr>
+            <a:spLocks noGrp="1"/>
+          </p:cNvSpPr>
+          <p:nvPr>
+            <p:ph type="sldNum" sz="quarter" idx="11"/>
+          </p:nvPr>
+        </p:nvSpPr>
+        <p:spPr/>
+        <p:txBody>
+          <a:bodyPr/>
+          <a:lstStyle/>
+          <a:p>
+            <a:fld id="{338BD863-DCDC-5F43-A029-265BB7DA4A17}" type="slidenum">
+              <a:rPr lang="en-US" smtClean="0"/>
+              <a:pPr/>
+              <a:t>9</a:t>
+            </a:fld>
+            <a:endParaRPr lang="en-US" dirty="0"/>
+          </a:p>
+        </p:txBody>
+      </p:sp>
+      <p:sp>
+        <p:nvSpPr>
+          <p:cNvPr id="5" name="AutoShape 2" descr="G:\HD-Games\GitRepos\DesignPatterns\CAP392-02-PloP\artigos\03 - Pattern Language\entrega final\family-guy-simpsons2.webp"/>
+          <p:cNvSpPr>
+            <a:spLocks noChangeAspect="1" noChangeArrowheads="1"/>
+          </p:cNvSpPr>
+          <p:nvPr/>
+        </p:nvSpPr>
+        <p:spPr bwMode="auto">
+          <a:xfrm>
+            <a:off x="155575" y="-144463"/>
+            <a:ext cx="304800" cy="304801"/>
+          </a:xfrm>
+          <a:prstGeom prst="rect">
+            <a:avLst/>
+          </a:prstGeom>
+          <a:noFill/>
+          <a:extLst>
+            <a:ext uri="{909E8E84-426E-40DD-AFC4-6F175D3DCCD1}">
+              <a14:hiddenFill xmlns:a14="http://schemas.microsoft.com/office/drawing/2010/main">
+                <a:solidFill>
+                  <a:srgbClr val="FFFFFF"/>
+                </a:solidFill>
+              </a14:hiddenFill>
+            </a:ext>
+          </a:extLst>
+        </p:spPr>
+        <p:txBody>
+          <a:bodyPr vert="horz" wrap="square" lIns="91440" tIns="45720" rIns="91440" bIns="45720" numCol="1" anchor="t" anchorCtr="0" compatLnSpc="1">
+            <a:prstTxWarp prst="textNoShape">
+              <a:avLst/>
+            </a:prstTxWarp>
+          </a:bodyPr>
+          <a:lstStyle/>
+          <a:p>
+            <a:endParaRPr lang="pt-BR"/>
+          </a:p>
+        </p:txBody>
+      </p:sp>
+      <p:sp>
+        <p:nvSpPr>
+          <p:cNvPr id="7" name="AutoShape 4" descr="G:\HD-Games\GitRepos\DesignPatterns\CAP392-02-PloP\artigos\03 - Pattern Language\entrega final\family-guy-simpsons2.webp"/>
+          <p:cNvSpPr>
+            <a:spLocks noChangeAspect="1" noChangeArrowheads="1"/>
+          </p:cNvSpPr>
+          <p:nvPr/>
+        </p:nvSpPr>
+        <p:spPr bwMode="auto">
+          <a:xfrm>
+            <a:off x="307975" y="7937"/>
+            <a:ext cx="304800" cy="304801"/>
+          </a:xfrm>
+          <a:prstGeom prst="rect">
+            <a:avLst/>
+          </a:prstGeom>
+          <a:noFill/>
+          <a:extLst>
+            <a:ext uri="{909E8E84-426E-40DD-AFC4-6F175D3DCCD1}">
+              <a14:hiddenFill xmlns:a14="http://schemas.microsoft.com/office/drawing/2010/main">
+                <a:solidFill>
+                  <a:srgbClr val="FFFFFF"/>
+                </a:solidFill>
+              </a14:hiddenFill>
+            </a:ext>
+          </a:extLst>
+        </p:spPr>
+        <p:txBody>
+          <a:bodyPr vert="horz" wrap="square" lIns="91440" tIns="45720" rIns="91440" bIns="45720" numCol="1" anchor="t" anchorCtr="0" compatLnSpc="1">
+            <a:prstTxWarp prst="textNoShape">
+              <a:avLst/>
+            </a:prstTxWarp>
+          </a:bodyPr>
+          <a:lstStyle/>
+          <a:p>
+            <a:endParaRPr lang="pt-BR"/>
+          </a:p>
+        </p:txBody>
+      </p:sp>
+      <p:sp>
+        <p:nvSpPr>
+          <p:cNvPr id="13" name="Title 3"/>
+          <p:cNvSpPr>
+            <a:spLocks noGrp="1"/>
+          </p:cNvSpPr>
+          <p:nvPr>
+            <p:ph type="title"/>
+          </p:nvPr>
+        </p:nvSpPr>
+        <p:spPr/>
+        <p:txBody>
+          <a:bodyPr>
+            <a:normAutofit/>
+          </a:bodyPr>
+          <a:lstStyle/>
+          <a:p>
+            <a:r>
+              <a:rPr lang="pt-BR" dirty="0" smtClean="0">
+                <a:solidFill>
+                  <a:srgbClr val="0070C0"/>
+                </a:solidFill>
+                <a:effectLst>
+                  <a:outerShdw blurRad="38100" dist="38100" dir="2700000" algn="tl">
+                    <a:srgbClr val="000000">
+                      <a:alpha val="43137"/>
+                    </a:srgbClr>
+                  </a:outerShdw>
+                </a:effectLst>
+              </a:rPr>
+              <a:t>Exemplo – Função (Código Teste2)</a:t>
+            </a:r>
+            <a:endParaRPr lang="pt-BR" dirty="0">
+              <a:solidFill>
+                <a:srgbClr val="0070C0"/>
+              </a:solidFill>
+              <a:effectLst>
+                <a:outerShdw blurRad="38100" dist="38100" dir="2700000" algn="tl">
+                  <a:srgbClr val="000000">
+                    <a:alpha val="43137"/>
+                  </a:srgbClr>
+                </a:outerShdw>
+              </a:effectLst>
+            </a:endParaRPr>
+          </a:p>
+        </p:txBody>
+      </p:sp>
+      <p:pic>
+        <p:nvPicPr>
+          <p:cNvPr id="5123" name="Picture 3"/>
+          <p:cNvPicPr>
+            <a:picLocks noChangeAspect="1" noChangeArrowheads="1"/>
+          </p:cNvPicPr>
+          <p:nvPr/>
+        </p:nvPicPr>
+        <p:blipFill>
+          <a:blip r:embed="rId2">
+            <a:extLst>
+              <a:ext uri="{28A0092B-C50C-407E-A947-70E740481C1C}">
+                <a14:useLocalDpi xmlns:a14="http://schemas.microsoft.com/office/drawing/2010/main" val="0"/>
+              </a:ext>
+            </a:extLst>
+          </a:blip>
+          <a:srcRect/>
+          <a:stretch>
+            <a:fillRect/>
+          </a:stretch>
+        </p:blipFill>
+        <p:spPr bwMode="auto">
+          <a:xfrm>
+            <a:off x="321645" y="1124744"/>
+            <a:ext cx="8210550" cy="3990975"/>
+          </a:xfrm>
+          <a:prstGeom prst="rect">
+            <a:avLst/>
+          </a:prstGeom>
+          <a:noFill/>
+          <a:ln>
+            <a:noFill/>
+          </a:ln>
+          <a:effectLst/>
+          <a:extLst>
+            <a:ext uri="{909E8E84-426E-40DD-AFC4-6F175D3DCCD1}">
+              <a14:hiddenFill xmlns:a14="http://schemas.microsoft.com/office/drawing/2010/main">
+                <a:solidFill>
+                  <a:schemeClr val="accent1"/>
+                </a:solidFill>
+              </a14:hiddenFill>
+            </a:ext>
+            <a:ext uri="{91240B29-F687-4F45-9708-019B960494DF}">
+              <a14:hiddenLine xmlns:a14="http://schemas.microsoft.com/office/drawing/2010/main" w="9525">
+                <a:solidFill>
+                  <a:schemeClr val="tx1"/>
+                </a:solidFill>
+                <a:miter lim="800000"/>
+                <a:headEnd/>
+                <a:tailEnd/>
+              </a14:hiddenLine>
+            </a:ext>
+            <a:ext uri="{AF507438-7753-43E0-B8FC-AC1667EBCBE1}">
+              <a14:hiddenEffects xmlns:a14="http://schemas.microsoft.com/office/drawing/2010/main">
+                <a:effectLst>
+                  <a:outerShdw dist="35921" dir="2700000" algn="ctr" rotWithShape="0">
+                    <a:schemeClr val="bg2"/>
+                  </a:outerShdw>
+                </a:effectLst>
+              </a14:hiddenEffects>
+            </a:ext>
+          </a:extLst>
+        </p:spPr>
+      </p:pic>
+      <p:pic>
+        <p:nvPicPr>
+          <p:cNvPr id="5124" name="Picture 4"/>
+          <p:cNvPicPr>
+            <a:picLocks noChangeAspect="1" noChangeArrowheads="1"/>
+          </p:cNvPicPr>
+          <p:nvPr/>
+        </p:nvPicPr>
+        <p:blipFill>
+          <a:blip r:embed="rId3">
+            <a:extLst>
+              <a:ext uri="{28A0092B-C50C-407E-A947-70E740481C1C}">
+                <a14:useLocalDpi xmlns:a14="http://schemas.microsoft.com/office/drawing/2010/main" val="0"/>
+              </a:ext>
+            </a:extLst>
+          </a:blip>
+          <a:srcRect/>
+          <a:stretch>
+            <a:fillRect/>
+          </a:stretch>
+        </p:blipFill>
+        <p:spPr bwMode="auto">
+          <a:xfrm>
+            <a:off x="647071" y="2276872"/>
+            <a:ext cx="8210550" cy="4000500"/>
+          </a:xfrm>
+          <a:prstGeom prst="rect">
+            <a:avLst/>
+          </a:prstGeom>
+          <a:noFill/>
+          <a:ln>
+            <a:noFill/>
+          </a:ln>
+          <a:effectLst/>
+          <a:extLst>
+            <a:ext uri="{909E8E84-426E-40DD-AFC4-6F175D3DCCD1}">
+              <a14:hiddenFill xmlns:a14="http://schemas.microsoft.com/office/drawing/2010/main">
+                <a:solidFill>
+                  <a:schemeClr val="accent1"/>
+                </a:solidFill>
+              </a14:hiddenFill>
+            </a:ext>
+            <a:ext uri="{91240B29-F687-4F45-9708-019B960494DF}">
+              <a14:hiddenLine xmlns:a14="http://schemas.microsoft.com/office/drawing/2010/main" w="9525">
+                <a:solidFill>
+                  <a:schemeClr val="tx1"/>
+                </a:solidFill>
+                <a:miter lim="800000"/>
+                <a:headEnd/>
+                <a:tailEnd/>
+              </a14:hiddenLine>
+            </a:ext>
+            <a:ext uri="{AF507438-7753-43E0-B8FC-AC1667EBCBE1}">
+              <a14:hiddenEffects xmlns:a14="http://schemas.microsoft.com/office/drawing/2010/main">
+                <a:effectLst>
+                  <a:outerShdw dist="35921" dir="2700000" algn="ctr" rotWithShape="0">
+                    <a:schemeClr val="bg2"/>
+                  </a:outerShdw>
+                </a:effectLst>
+              </a14:hiddenEffects>
+            </a:ext>
+          </a:extLst>
+        </p:spPr>
+      </p:pic>
+    </p:spTree>
+    <p:extLst>
+      <p:ext uri="{BB962C8B-B14F-4D97-AF65-F5344CB8AC3E}">
+        <p14:creationId xmlns:p14="http://schemas.microsoft.com/office/powerpoint/2010/main" val="333763139"/>
+      </p:ext>
+    </p:extLst>
+  </p:cSld>
+  <p:clrMapOvr>
+    <a:masterClrMapping/>
+  </p:clrMapOvr>
+  <mc:AlternateContent xmlns:mc="http://schemas.openxmlformats.org/markup-compatibility/2006">
+    <mc:Choice xmlns:p14="http://schemas.microsoft.com/office/powerpoint/2010/main" Requires="p14">
+      <p:transition p14:dur="10"/>
+    </mc:Choice>
+    <mc:Fallback>
+      <p:transition/>
+    </mc:Fallback>
+  </mc:AlternateContent>
+  <p:timing>
+    <p:tnLst>
+      <p:par>
+        <p:cTn id="1" dur="indefinite" restart="never" nodeType="tmRoot">
+          <p:childTnLst>
+            <p:seq concurrent="1" nextAc="seek">
+              <p:cTn id="2" dur="indefinite" nodeType="mainSeq">
+                <p:childTnLst>
+                  <p:par>
+                    <p:cTn id="3" fill="hold">
+                      <p:stCondLst>
+                        <p:cond delay="indefinite"/>
+                      </p:stCondLst>
+                      <p:childTnLst>
+                        <p:par>
+                          <p:cTn id="4" fill="hold">
+                            <p:stCondLst>
+                              <p:cond delay="0"/>
+                            </p:stCondLst>
+                            <p:childTnLst>
+                              <p:par>
+                                <p:cTn id="5" presetID="22" presetClass="entr" presetSubtype="1" fill="hold" nodeType="clickEffect">
+                                  <p:stCondLst>
+                                    <p:cond delay="0"/>
+                                  </p:stCondLst>
+                                  <p:childTnLst>
+                                    <p:set>
+                                      <p:cBhvr>
+                                        <p:cTn id="6" dur="1" fill="hold">
+                                          <p:stCondLst>
+                                            <p:cond delay="0"/>
+                                          </p:stCondLst>
+                                        </p:cTn>
+                                        <p:tgtEl>
+                                          <p:spTgt spid="5124"/>
+                                        </p:tgtEl>
+                                        <p:attrNameLst>
+                                          <p:attrName>style.visibility</p:attrName>
+                                        </p:attrNameLst>
+                                      </p:cBhvr>
+                                      <p:to>
+                                        <p:strVal val="visible"/>
+                                      </p:to>
+                                    </p:set>
+                                    <p:animEffect transition="in" filter="wipe(up)">
+                                      <p:cBhvr>
+                                        <p:cTn id="7" dur="500"/>
+                                        <p:tgtEl>
+                                          <p:spTgt spid="5124"/>
+                                        </p:tgtEl>
+                                      </p:cBhvr>
+                                    </p:animEffect>
+                                  </p:childTnLst>
+                                </p:cTn>
+                              </p:par>
+                            </p:childTnLst>
+                          </p:cTn>
+                        </p:par>
+                      </p:childTnLst>
+                    </p:cTn>
+                  </p:par>
+                </p:childTnLst>
+              </p:cTn>
+              <p:prevCondLst>
+                <p:cond evt="onPrev" delay="0">
+                  <p:tgtEl>
+                    <p:sldTgt/>
+                  </p:tgtEl>
+                </p:cond>
+              </p:prevCondLst>
+              <p:nextCondLst>
+                <p:cond evt="onNext" delay="0">
+                  <p:tgtEl>
+                    <p:sldTgt/>
+                  </p:tgtEl>
+                </p:cond>
+              </p:nextCondLst>
+            </p:seq>
+          </p:childTnLst>
+        </p:cTn>
       </p:par>
     </p:tnLst>
   </p:timing>

</xml_diff>

<commit_message>
Versão final do PPT com as conclusões. Arquivo PDF
</commit_message>
<xml_diff>
--- a/CAP385-00-Presentations/01-MATLAB xUnit Test Framework.pptx
+++ b/CAP385-00-Presentations/01-MATLAB xUnit Test Framework.pptx
@@ -5,7 +5,7 @@
     <p:sldMasterId id="2147483648" r:id="rId1"/>
   </p:sldMasterIdLst>
   <p:notesMasterIdLst>
-    <p:notesMasterId r:id="rId11"/>
+    <p:notesMasterId r:id="rId13"/>
   </p:notesMasterIdLst>
   <p:sldIdLst>
     <p:sldId id="257" r:id="rId2"/>
@@ -17,6 +17,8 @@
     <p:sldId id="275" r:id="rId8"/>
     <p:sldId id="276" r:id="rId9"/>
     <p:sldId id="277" r:id="rId10"/>
+    <p:sldId id="278" r:id="rId11"/>
+    <p:sldId id="279" r:id="rId12"/>
   </p:sldIdLst>
   <p:sldSz cx="9144000" cy="6858000" type="screen4x3"/>
   <p:notesSz cx="6858000" cy="9144000"/>
@@ -4065,6 +4067,537 @@
 </p:sld>
 </file>
 
+<file path=ppt/slides/slide10.xml><?xml version="1.0" encoding="utf-8"?>
+<p:sld xmlns:a="http://schemas.openxmlformats.org/drawingml/2006/main" xmlns:r="http://schemas.openxmlformats.org/officeDocument/2006/relationships" xmlns:p="http://schemas.openxmlformats.org/presentationml/2006/main">
+  <p:cSld>
+    <p:spTree>
+      <p:nvGrpSpPr>
+        <p:cNvPr id="1" name=""/>
+        <p:cNvGrpSpPr/>
+        <p:nvPr/>
+      </p:nvGrpSpPr>
+      <p:grpSpPr>
+        <a:xfrm>
+          <a:off x="0" y="0"/>
+          <a:ext cx="0" cy="0"/>
+          <a:chOff x="0" y="0"/>
+          <a:chExt cx="0" cy="0"/>
+        </a:xfrm>
+      </p:grpSpPr>
+      <p:sp>
+        <p:nvSpPr>
+          <p:cNvPr id="3" name="Slide Number Placeholder 2"/>
+          <p:cNvSpPr>
+            <a:spLocks noGrp="1"/>
+          </p:cNvSpPr>
+          <p:nvPr>
+            <p:ph type="sldNum" sz="quarter" idx="11"/>
+          </p:nvPr>
+        </p:nvSpPr>
+        <p:spPr/>
+        <p:txBody>
+          <a:bodyPr/>
+          <a:lstStyle/>
+          <a:p>
+            <a:fld id="{338BD863-DCDC-5F43-A029-265BB7DA4A17}" type="slidenum">
+              <a:rPr lang="en-US" smtClean="0"/>
+              <a:pPr/>
+              <a:t>10</a:t>
+            </a:fld>
+            <a:endParaRPr lang="en-US" dirty="0"/>
+          </a:p>
+        </p:txBody>
+      </p:sp>
+      <p:sp>
+        <p:nvSpPr>
+          <p:cNvPr id="5" name="AutoShape 2" descr="G:\HD-Games\GitRepos\DesignPatterns\CAP392-02-PloP\artigos\03 - Pattern Language\entrega final\family-guy-simpsons2.webp"/>
+          <p:cNvSpPr>
+            <a:spLocks noChangeAspect="1" noChangeArrowheads="1"/>
+          </p:cNvSpPr>
+          <p:nvPr/>
+        </p:nvSpPr>
+        <p:spPr bwMode="auto">
+          <a:xfrm>
+            <a:off x="155575" y="-144463"/>
+            <a:ext cx="304800" cy="304801"/>
+          </a:xfrm>
+          <a:prstGeom prst="rect">
+            <a:avLst/>
+          </a:prstGeom>
+          <a:noFill/>
+          <a:extLst>
+            <a:ext uri="{909E8E84-426E-40DD-AFC4-6F175D3DCCD1}">
+              <a14:hiddenFill xmlns:a14="http://schemas.microsoft.com/office/drawing/2010/main">
+                <a:solidFill>
+                  <a:srgbClr val="FFFFFF"/>
+                </a:solidFill>
+              </a14:hiddenFill>
+            </a:ext>
+          </a:extLst>
+        </p:spPr>
+        <p:txBody>
+          <a:bodyPr vert="horz" wrap="square" lIns="91440" tIns="45720" rIns="91440" bIns="45720" numCol="1" anchor="t" anchorCtr="0" compatLnSpc="1">
+            <a:prstTxWarp prst="textNoShape">
+              <a:avLst/>
+            </a:prstTxWarp>
+          </a:bodyPr>
+          <a:lstStyle/>
+          <a:p>
+            <a:endParaRPr lang="pt-BR"/>
+          </a:p>
+        </p:txBody>
+      </p:sp>
+      <p:sp>
+        <p:nvSpPr>
+          <p:cNvPr id="7" name="AutoShape 4" descr="G:\HD-Games\GitRepos\DesignPatterns\CAP392-02-PloP\artigos\03 - Pattern Language\entrega final\family-guy-simpsons2.webp"/>
+          <p:cNvSpPr>
+            <a:spLocks noChangeAspect="1" noChangeArrowheads="1"/>
+          </p:cNvSpPr>
+          <p:nvPr/>
+        </p:nvSpPr>
+        <p:spPr bwMode="auto">
+          <a:xfrm>
+            <a:off x="307975" y="7937"/>
+            <a:ext cx="304800" cy="304801"/>
+          </a:xfrm>
+          <a:prstGeom prst="rect">
+            <a:avLst/>
+          </a:prstGeom>
+          <a:noFill/>
+          <a:extLst>
+            <a:ext uri="{909E8E84-426E-40DD-AFC4-6F175D3DCCD1}">
+              <a14:hiddenFill xmlns:a14="http://schemas.microsoft.com/office/drawing/2010/main">
+                <a:solidFill>
+                  <a:srgbClr val="FFFFFF"/>
+                </a:solidFill>
+              </a14:hiddenFill>
+            </a:ext>
+          </a:extLst>
+        </p:spPr>
+        <p:txBody>
+          <a:bodyPr vert="horz" wrap="square" lIns="91440" tIns="45720" rIns="91440" bIns="45720" numCol="1" anchor="t" anchorCtr="0" compatLnSpc="1">
+            <a:prstTxWarp prst="textNoShape">
+              <a:avLst/>
+            </a:prstTxWarp>
+          </a:bodyPr>
+          <a:lstStyle/>
+          <a:p>
+            <a:endParaRPr lang="pt-BR"/>
+          </a:p>
+        </p:txBody>
+      </p:sp>
+      <p:sp>
+        <p:nvSpPr>
+          <p:cNvPr id="13" name="Title 3"/>
+          <p:cNvSpPr>
+            <a:spLocks noGrp="1"/>
+          </p:cNvSpPr>
+          <p:nvPr>
+            <p:ph type="title"/>
+          </p:nvPr>
+        </p:nvSpPr>
+        <p:spPr/>
+        <p:txBody>
+          <a:bodyPr>
+            <a:normAutofit/>
+          </a:bodyPr>
+          <a:lstStyle/>
+          <a:p>
+            <a:r>
+              <a:rPr lang="pt-BR" sz="3600" dirty="0" smtClean="0">
+                <a:solidFill>
+                  <a:srgbClr val="0070C0"/>
+                </a:solidFill>
+                <a:effectLst>
+                  <a:outerShdw blurRad="38100" dist="38100" dir="2700000" algn="tl">
+                    <a:srgbClr val="000000">
+                      <a:alpha val="43137"/>
+                    </a:srgbClr>
+                  </a:outerShdw>
+                </a:effectLst>
+              </a:rPr>
+              <a:t>Exemplo – Função (Resultados Correção)</a:t>
+            </a:r>
+            <a:endParaRPr lang="pt-BR" sz="3600" dirty="0">
+              <a:solidFill>
+                <a:srgbClr val="0070C0"/>
+              </a:solidFill>
+              <a:effectLst>
+                <a:outerShdw blurRad="38100" dist="38100" dir="2700000" algn="tl">
+                  <a:srgbClr val="000000">
+                    <a:alpha val="43137"/>
+                  </a:srgbClr>
+                </a:outerShdw>
+              </a:effectLst>
+            </a:endParaRPr>
+          </a:p>
+        </p:txBody>
+      </p:sp>
+      <p:pic>
+        <p:nvPicPr>
+          <p:cNvPr id="8195" name="Picture 3"/>
+          <p:cNvPicPr>
+            <a:picLocks noChangeAspect="1" noChangeArrowheads="1"/>
+          </p:cNvPicPr>
+          <p:nvPr/>
+        </p:nvPicPr>
+        <p:blipFill>
+          <a:blip r:embed="rId2">
+            <a:extLst>
+              <a:ext uri="{28A0092B-C50C-407E-A947-70E740481C1C}">
+                <a14:useLocalDpi xmlns:a14="http://schemas.microsoft.com/office/drawing/2010/main" val="0"/>
+              </a:ext>
+            </a:extLst>
+          </a:blip>
+          <a:srcRect/>
+          <a:stretch>
+            <a:fillRect/>
+          </a:stretch>
+        </p:blipFill>
+        <p:spPr bwMode="auto">
+          <a:xfrm>
+            <a:off x="1331640" y="1052735"/>
+            <a:ext cx="6840760" cy="5647971"/>
+          </a:xfrm>
+          <a:prstGeom prst="rect">
+            <a:avLst/>
+          </a:prstGeom>
+          <a:noFill/>
+          <a:ln>
+            <a:noFill/>
+          </a:ln>
+          <a:effectLst/>
+          <a:extLst>
+            <a:ext uri="{909E8E84-426E-40DD-AFC4-6F175D3DCCD1}">
+              <a14:hiddenFill xmlns:a14="http://schemas.microsoft.com/office/drawing/2010/main">
+                <a:solidFill>
+                  <a:schemeClr val="accent1"/>
+                </a:solidFill>
+              </a14:hiddenFill>
+            </a:ext>
+            <a:ext uri="{91240B29-F687-4F45-9708-019B960494DF}">
+              <a14:hiddenLine xmlns:a14="http://schemas.microsoft.com/office/drawing/2010/main" w="9525">
+                <a:solidFill>
+                  <a:schemeClr val="tx1"/>
+                </a:solidFill>
+                <a:miter lim="800000"/>
+                <a:headEnd/>
+                <a:tailEnd/>
+              </a14:hiddenLine>
+            </a:ext>
+            <a:ext uri="{AF507438-7753-43E0-B8FC-AC1667EBCBE1}">
+              <a14:hiddenEffects xmlns:a14="http://schemas.microsoft.com/office/drawing/2010/main">
+                <a:effectLst>
+                  <a:outerShdw dist="35921" dir="2700000" algn="ctr" rotWithShape="0">
+                    <a:schemeClr val="bg2"/>
+                  </a:outerShdw>
+                </a:effectLst>
+              </a14:hiddenEffects>
+            </a:ext>
+          </a:extLst>
+        </p:spPr>
+      </p:pic>
+    </p:spTree>
+    <p:extLst>
+      <p:ext uri="{BB962C8B-B14F-4D97-AF65-F5344CB8AC3E}">
+        <p14:creationId xmlns:p14="http://schemas.microsoft.com/office/powerpoint/2010/main" val="3022737950"/>
+      </p:ext>
+    </p:extLst>
+  </p:cSld>
+  <p:clrMapOvr>
+    <a:masterClrMapping/>
+  </p:clrMapOvr>
+  <mc:AlternateContent xmlns:mc="http://schemas.openxmlformats.org/markup-compatibility/2006" xmlns:p14="http://schemas.microsoft.com/office/powerpoint/2010/main">
+    <mc:Choice Requires="p14">
+      <p:transition p14:dur="0"/>
+    </mc:Choice>
+    <mc:Fallback xmlns="">
+      <p:transition/>
+    </mc:Fallback>
+  </mc:AlternateContent>
+  <p:timing>
+    <p:tnLst>
+      <p:par>
+        <p:cTn id="1" dur="indefinite" restart="never" nodeType="tmRoot"/>
+      </p:par>
+    </p:tnLst>
+  </p:timing>
+</p:sld>
+</file>
+
+<file path=ppt/slides/slide11.xml><?xml version="1.0" encoding="utf-8"?>
+<p:sld xmlns:a="http://schemas.openxmlformats.org/drawingml/2006/main" xmlns:r="http://schemas.openxmlformats.org/officeDocument/2006/relationships" xmlns:p="http://schemas.openxmlformats.org/presentationml/2006/main">
+  <p:cSld>
+    <p:spTree>
+      <p:nvGrpSpPr>
+        <p:cNvPr id="1" name=""/>
+        <p:cNvGrpSpPr/>
+        <p:nvPr/>
+      </p:nvGrpSpPr>
+      <p:grpSpPr>
+        <a:xfrm>
+          <a:off x="0" y="0"/>
+          <a:ext cx="0" cy="0"/>
+          <a:chOff x="0" y="0"/>
+          <a:chExt cx="0" cy="0"/>
+        </a:xfrm>
+      </p:grpSpPr>
+      <p:sp>
+        <p:nvSpPr>
+          <p:cNvPr id="3" name="Slide Number Placeholder 2"/>
+          <p:cNvSpPr>
+            <a:spLocks noGrp="1"/>
+          </p:cNvSpPr>
+          <p:nvPr>
+            <p:ph type="sldNum" sz="quarter" idx="11"/>
+          </p:nvPr>
+        </p:nvSpPr>
+        <p:spPr/>
+        <p:txBody>
+          <a:bodyPr/>
+          <a:lstStyle/>
+          <a:p>
+            <a:fld id="{338BD863-DCDC-5F43-A029-265BB7DA4A17}" type="slidenum">
+              <a:rPr lang="en-US" smtClean="0"/>
+              <a:pPr/>
+              <a:t>11</a:t>
+            </a:fld>
+            <a:endParaRPr lang="en-US" dirty="0"/>
+          </a:p>
+        </p:txBody>
+      </p:sp>
+      <p:sp>
+        <p:nvSpPr>
+          <p:cNvPr id="4" name="Title 3"/>
+          <p:cNvSpPr>
+            <a:spLocks noGrp="1"/>
+          </p:cNvSpPr>
+          <p:nvPr>
+            <p:ph type="title"/>
+          </p:nvPr>
+        </p:nvSpPr>
+        <p:spPr/>
+        <p:txBody>
+          <a:bodyPr>
+            <a:normAutofit/>
+          </a:bodyPr>
+          <a:lstStyle/>
+          <a:p>
+            <a:r>
+              <a:rPr lang="pt-BR" dirty="0" smtClean="0">
+                <a:solidFill>
+                  <a:srgbClr val="0070C0"/>
+                </a:solidFill>
+                <a:effectLst>
+                  <a:outerShdw blurRad="38100" dist="38100" dir="2700000" algn="tl">
+                    <a:srgbClr val="000000">
+                      <a:alpha val="43137"/>
+                    </a:srgbClr>
+                  </a:outerShdw>
+                </a:effectLst>
+              </a:rPr>
+              <a:t>Considerações</a:t>
+            </a:r>
+            <a:endParaRPr lang="pt-BR" dirty="0">
+              <a:solidFill>
+                <a:srgbClr val="0070C0"/>
+              </a:solidFill>
+              <a:effectLst>
+                <a:outerShdw blurRad="38100" dist="38100" dir="2700000" algn="tl">
+                  <a:srgbClr val="000000">
+                    <a:alpha val="43137"/>
+                  </a:srgbClr>
+                </a:outerShdw>
+              </a:effectLst>
+            </a:endParaRPr>
+          </a:p>
+        </p:txBody>
+      </p:sp>
+      <p:sp>
+        <p:nvSpPr>
+          <p:cNvPr id="2" name="Espaço Reservado para Conteúdo 1"/>
+          <p:cNvSpPr>
+            <a:spLocks noGrp="1"/>
+          </p:cNvSpPr>
+          <p:nvPr>
+            <p:ph idx="1"/>
+          </p:nvPr>
+        </p:nvSpPr>
+        <p:spPr/>
+        <p:txBody>
+          <a:bodyPr>
+            <a:normAutofit/>
+          </a:bodyPr>
+          <a:lstStyle/>
+          <a:p>
+            <a:r>
+              <a:rPr lang="pt-BR" dirty="0" smtClean="0"/>
+              <a:t>Framework ?</a:t>
+            </a:r>
+          </a:p>
+          <a:p>
+            <a:pPr lvl="1"/>
+            <a:r>
+              <a:rPr lang="pt-BR" dirty="0" err="1" smtClean="0"/>
+              <a:t>runtests</a:t>
+            </a:r>
+            <a:r>
+              <a:rPr lang="pt-BR" dirty="0" smtClean="0"/>
+              <a:t>(‘</a:t>
+            </a:r>
+            <a:r>
+              <a:rPr lang="pt-BR" dirty="0" err="1" smtClean="0"/>
+              <a:t>test_suite</a:t>
+            </a:r>
+            <a:r>
+              <a:rPr lang="pt-BR" dirty="0" smtClean="0"/>
+              <a:t>’)</a:t>
+            </a:r>
+          </a:p>
+          <a:p>
+            <a:pPr lvl="1"/>
+            <a:r>
+              <a:rPr lang="pt-BR" dirty="0" smtClean="0"/>
+              <a:t>Assertivas / Instrumentação</a:t>
+            </a:r>
+          </a:p>
+          <a:p>
+            <a:pPr lvl="1"/>
+            <a:r>
+              <a:rPr lang="pt-BR" dirty="0" smtClean="0"/>
+              <a:t>Resultados tabelados</a:t>
+            </a:r>
+          </a:p>
+          <a:p>
+            <a:pPr lvl="1"/>
+            <a:r>
+              <a:rPr lang="pt-BR" dirty="0" smtClean="0"/>
+              <a:t>Desempenho</a:t>
+            </a:r>
+          </a:p>
+          <a:p>
+            <a:pPr lvl="1"/>
+            <a:endParaRPr lang="pt-BR" dirty="0" smtClean="0"/>
+          </a:p>
+          <a:p>
+            <a:endParaRPr lang="pt-BR" dirty="0" smtClean="0"/>
+          </a:p>
+          <a:p>
+            <a:pPr lvl="1"/>
+            <a:endParaRPr lang="pt-BR" dirty="0" smtClean="0"/>
+          </a:p>
+          <a:p>
+            <a:pPr lvl="1"/>
+            <a:endParaRPr lang="pt-BR" dirty="0" smtClean="0"/>
+          </a:p>
+        </p:txBody>
+      </p:sp>
+      <p:sp>
+        <p:nvSpPr>
+          <p:cNvPr id="5" name="AutoShape 2" descr="G:\HD-Games\GitRepos\DesignPatterns\CAP392-02-PloP\artigos\03 - Pattern Language\entrega final\family-guy-simpsons2.webp"/>
+          <p:cNvSpPr>
+            <a:spLocks noChangeAspect="1" noChangeArrowheads="1"/>
+          </p:cNvSpPr>
+          <p:nvPr/>
+        </p:nvSpPr>
+        <p:spPr bwMode="auto">
+          <a:xfrm>
+            <a:off x="155575" y="-144463"/>
+            <a:ext cx="304800" cy="304801"/>
+          </a:xfrm>
+          <a:prstGeom prst="rect">
+            <a:avLst/>
+          </a:prstGeom>
+          <a:noFill/>
+          <a:extLst>
+            <a:ext uri="{909E8E84-426E-40DD-AFC4-6F175D3DCCD1}">
+              <a14:hiddenFill xmlns:a14="http://schemas.microsoft.com/office/drawing/2010/main">
+                <a:solidFill>
+                  <a:srgbClr val="FFFFFF"/>
+                </a:solidFill>
+              </a14:hiddenFill>
+            </a:ext>
+          </a:extLst>
+        </p:spPr>
+        <p:txBody>
+          <a:bodyPr vert="horz" wrap="square" lIns="91440" tIns="45720" rIns="91440" bIns="45720" numCol="1" anchor="t" anchorCtr="0" compatLnSpc="1">
+            <a:prstTxWarp prst="textNoShape">
+              <a:avLst/>
+            </a:prstTxWarp>
+          </a:bodyPr>
+          <a:lstStyle/>
+          <a:p>
+            <a:endParaRPr lang="pt-BR"/>
+          </a:p>
+        </p:txBody>
+      </p:sp>
+      <p:sp>
+        <p:nvSpPr>
+          <p:cNvPr id="7" name="AutoShape 4" descr="G:\HD-Games\GitRepos\DesignPatterns\CAP392-02-PloP\artigos\03 - Pattern Language\entrega final\family-guy-simpsons2.webp"/>
+          <p:cNvSpPr>
+            <a:spLocks noChangeAspect="1" noChangeArrowheads="1"/>
+          </p:cNvSpPr>
+          <p:nvPr/>
+        </p:nvSpPr>
+        <p:spPr bwMode="auto">
+          <a:xfrm>
+            <a:off x="307975" y="7937"/>
+            <a:ext cx="304800" cy="304801"/>
+          </a:xfrm>
+          <a:prstGeom prst="rect">
+            <a:avLst/>
+          </a:prstGeom>
+          <a:noFill/>
+          <a:extLst>
+            <a:ext uri="{909E8E84-426E-40DD-AFC4-6F175D3DCCD1}">
+              <a14:hiddenFill xmlns:a14="http://schemas.microsoft.com/office/drawing/2010/main">
+                <a:solidFill>
+                  <a:srgbClr val="FFFFFF"/>
+                </a:solidFill>
+              </a14:hiddenFill>
+            </a:ext>
+          </a:extLst>
+        </p:spPr>
+        <p:txBody>
+          <a:bodyPr vert="horz" wrap="square" lIns="91440" tIns="45720" rIns="91440" bIns="45720" numCol="1" anchor="t" anchorCtr="0" compatLnSpc="1">
+            <a:prstTxWarp prst="textNoShape">
+              <a:avLst/>
+            </a:prstTxWarp>
+          </a:bodyPr>
+          <a:lstStyle/>
+          <a:p>
+            <a:endParaRPr lang="pt-BR"/>
+          </a:p>
+        </p:txBody>
+      </p:sp>
+    </p:spTree>
+    <p:extLst>
+      <p:ext uri="{BB962C8B-B14F-4D97-AF65-F5344CB8AC3E}">
+        <p14:creationId xmlns:p14="http://schemas.microsoft.com/office/powerpoint/2010/main" val="4243044682"/>
+      </p:ext>
+    </p:extLst>
+  </p:cSld>
+  <p:clrMapOvr>
+    <a:masterClrMapping/>
+  </p:clrMapOvr>
+  <mc:AlternateContent xmlns:mc="http://schemas.openxmlformats.org/markup-compatibility/2006" xmlns:p14="http://schemas.microsoft.com/office/powerpoint/2010/main">
+    <mc:Choice Requires="p14">
+      <p:transition p14:dur="0"/>
+    </mc:Choice>
+    <mc:Fallback xmlns="">
+      <p:transition/>
+    </mc:Fallback>
+  </mc:AlternateContent>
+  <p:timing>
+    <p:tnLst>
+      <p:par>
+        <p:cTn id="1" dur="indefinite" restart="never" nodeType="tmRoot"/>
+      </p:par>
+    </p:tnLst>
+  </p:timing>
+</p:sld>
+</file>
+
 <file path=ppt/slides/slide2.xml><?xml version="1.0" encoding="utf-8"?>
 <p:sld xmlns:a="http://schemas.openxmlformats.org/drawingml/2006/main" xmlns:r="http://schemas.openxmlformats.org/officeDocument/2006/relationships" xmlns:p="http://schemas.openxmlformats.org/presentationml/2006/main">
   <p:cSld>
@@ -5779,7 +6312,7 @@
                   </a:outerShdw>
                 </a:effectLst>
               </a:rPr>
-              <a:t>Exemplo – Função (Código Teste1)</a:t>
+              <a:t>Exemplo – Função (Código Teste)</a:t>
             </a:r>
             <a:endParaRPr lang="pt-BR" dirty="0">
               <a:solidFill>
@@ -6418,7 +6951,7 @@
         <p:spPr/>
         <p:txBody>
           <a:bodyPr>
-            <a:normAutofit/>
+            <a:normAutofit fontScale="90000"/>
           </a:bodyPr>
           <a:lstStyle/>
           <a:p>
@@ -6435,7 +6968,7 @@
                   </a:outerShdw>
                 </a:effectLst>
               </a:rPr>
-              <a:t>Exemplo – Função (Código Teste2)</a:t>
+              <a:t>Exemplo – Função (Código Correção)</a:t>
             </a:r>
             <a:endParaRPr lang="pt-BR" dirty="0">
               <a:solidFill>
@@ -6452,73 +6985,134 @@
           </a:p>
         </p:txBody>
       </p:sp>
+      <p:grpSp>
+        <p:nvGrpSpPr>
+          <p:cNvPr id="4" name="Grupo 3"/>
+          <p:cNvGrpSpPr/>
+          <p:nvPr/>
+        </p:nvGrpSpPr>
+        <p:grpSpPr>
+          <a:xfrm>
+            <a:off x="307975" y="1124744"/>
+            <a:ext cx="8220075" cy="4857750"/>
+            <a:chOff x="307975" y="1124744"/>
+            <a:chExt cx="8220075" cy="4857750"/>
+          </a:xfrm>
+        </p:grpSpPr>
+        <p:pic>
+          <p:nvPicPr>
+            <p:cNvPr id="7170" name="Picture 2"/>
+            <p:cNvPicPr>
+              <a:picLocks noChangeAspect="1" noChangeArrowheads="1"/>
+            </p:cNvPicPr>
+            <p:nvPr/>
+          </p:nvPicPr>
+          <p:blipFill>
+            <a:blip r:embed="rId2">
+              <a:extLst>
+                <a:ext uri="{28A0092B-C50C-407E-A947-70E740481C1C}">
+                  <a14:useLocalDpi xmlns:a14="http://schemas.microsoft.com/office/drawing/2010/main" val="0"/>
+                </a:ext>
+              </a:extLst>
+            </a:blip>
+            <a:srcRect/>
+            <a:stretch>
+              <a:fillRect/>
+            </a:stretch>
+          </p:blipFill>
+          <p:spPr bwMode="auto">
+            <a:xfrm>
+              <a:off x="307975" y="1124744"/>
+              <a:ext cx="8220075" cy="4857750"/>
+            </a:xfrm>
+            <a:prstGeom prst="rect">
+              <a:avLst/>
+            </a:prstGeom>
+            <a:noFill/>
+            <a:ln>
+              <a:noFill/>
+            </a:ln>
+            <a:effectLst/>
+            <a:extLst>
+              <a:ext uri="{909E8E84-426E-40DD-AFC4-6F175D3DCCD1}">
+                <a14:hiddenFill xmlns:a14="http://schemas.microsoft.com/office/drawing/2010/main">
+                  <a:solidFill>
+                    <a:schemeClr val="accent1"/>
+                  </a:solidFill>
+                </a14:hiddenFill>
+              </a:ext>
+              <a:ext uri="{91240B29-F687-4F45-9708-019B960494DF}">
+                <a14:hiddenLine xmlns:a14="http://schemas.microsoft.com/office/drawing/2010/main" w="9525">
+                  <a:solidFill>
+                    <a:schemeClr val="tx1"/>
+                  </a:solidFill>
+                  <a:miter lim="800000"/>
+                  <a:headEnd/>
+                  <a:tailEnd/>
+                </a14:hiddenLine>
+              </a:ext>
+              <a:ext uri="{AF507438-7753-43E0-B8FC-AC1667EBCBE1}">
+                <a14:hiddenEffects xmlns:a14="http://schemas.microsoft.com/office/drawing/2010/main">
+                  <a:effectLst>
+                    <a:outerShdw dist="35921" dir="2700000" algn="ctr" rotWithShape="0">
+                      <a:schemeClr val="bg2"/>
+                    </a:outerShdw>
+                  </a:effectLst>
+                </a14:hiddenEffects>
+              </a:ext>
+            </a:extLst>
+          </p:spPr>
+        </p:pic>
+        <p:sp>
+          <p:nvSpPr>
+            <p:cNvPr id="2" name="Elipse 1"/>
+            <p:cNvSpPr/>
+            <p:nvPr/>
+          </p:nvSpPr>
+          <p:spPr>
+            <a:xfrm>
+              <a:off x="707731" y="3014055"/>
+              <a:ext cx="2880320" cy="630969"/>
+            </a:xfrm>
+            <a:prstGeom prst="ellipse">
+              <a:avLst/>
+            </a:prstGeom>
+            <a:noFill/>
+            <a:ln>
+              <a:solidFill>
+                <a:schemeClr val="accent2"/>
+              </a:solidFill>
+            </a:ln>
+          </p:spPr>
+          <p:style>
+            <a:lnRef idx="2">
+              <a:schemeClr val="accent1">
+                <a:shade val="50000"/>
+              </a:schemeClr>
+            </a:lnRef>
+            <a:fillRef idx="1">
+              <a:schemeClr val="accent1"/>
+            </a:fillRef>
+            <a:effectRef idx="0">
+              <a:schemeClr val="accent1"/>
+            </a:effectRef>
+            <a:fontRef idx="minor">
+              <a:schemeClr val="lt1"/>
+            </a:fontRef>
+          </p:style>
+          <p:txBody>
+            <a:bodyPr rtlCol="0" anchor="ctr"/>
+            <a:lstStyle/>
+            <a:p>
+              <a:pPr algn="ctr"/>
+              <a:endParaRPr lang="pt-BR"/>
+            </a:p>
+          </p:txBody>
+        </p:sp>
+      </p:grpSp>
       <p:pic>
         <p:nvPicPr>
-          <p:cNvPr id="5123" name="Picture 3"/>
-          <p:cNvPicPr>
-            <a:picLocks noChangeAspect="1" noChangeArrowheads="1"/>
-          </p:cNvPicPr>
-          <p:nvPr/>
-        </p:nvPicPr>
-        <p:blipFill>
-          <a:blip r:embed="rId2">
-            <a:extLst>
-              <a:ext uri="{28A0092B-C50C-407E-A947-70E740481C1C}">
-                <a14:useLocalDpi xmlns:a14="http://schemas.microsoft.com/office/drawing/2010/main" val="0"/>
-              </a:ext>
-            </a:extLst>
-          </a:blip>
-          <a:srcRect/>
-          <a:stretch>
-            <a:fillRect/>
-          </a:stretch>
-        </p:blipFill>
-        <p:spPr bwMode="auto">
-          <a:xfrm>
-            <a:off x="321645" y="1124744"/>
-            <a:ext cx="8210550" cy="3990975"/>
-          </a:xfrm>
-          <a:prstGeom prst="rect">
-            <a:avLst/>
-          </a:prstGeom>
-          <a:noFill/>
-          <a:ln>
-            <a:noFill/>
-          </a:ln>
-          <a:effectLst/>
-          <a:extLst>
-            <a:ext uri="{909E8E84-426E-40DD-AFC4-6F175D3DCCD1}">
-              <a14:hiddenFill xmlns:a14="http://schemas.microsoft.com/office/drawing/2010/main">
-                <a:solidFill>
-                  <a:schemeClr val="accent1"/>
-                </a:solidFill>
-              </a14:hiddenFill>
-            </a:ext>
-            <a:ext uri="{91240B29-F687-4F45-9708-019B960494DF}">
-              <a14:hiddenLine xmlns:a14="http://schemas.microsoft.com/office/drawing/2010/main" w="9525">
-                <a:solidFill>
-                  <a:schemeClr val="tx1"/>
-                </a:solidFill>
-                <a:miter lim="800000"/>
-                <a:headEnd/>
-                <a:tailEnd/>
-              </a14:hiddenLine>
-            </a:ext>
-            <a:ext uri="{AF507438-7753-43E0-B8FC-AC1667EBCBE1}">
-              <a14:hiddenEffects xmlns:a14="http://schemas.microsoft.com/office/drawing/2010/main">
-                <a:effectLst>
-                  <a:outerShdw dist="35921" dir="2700000" algn="ctr" rotWithShape="0">
-                    <a:schemeClr val="bg2"/>
-                  </a:outerShdw>
-                </a:effectLst>
-              </a14:hiddenEffects>
-            </a:ext>
-          </a:extLst>
-        </p:spPr>
-      </p:pic>
-      <p:pic>
-        <p:nvPicPr>
-          <p:cNvPr id="5124" name="Picture 4"/>
+          <p:cNvPr id="7171" name="Picture 3"/>
           <p:cNvPicPr>
             <a:picLocks noChangeAspect="1" noChangeArrowheads="1"/>
           </p:cNvPicPr>
@@ -6539,8 +7133,8 @@
         </p:blipFill>
         <p:spPr bwMode="auto">
           <a:xfrm>
-            <a:off x="647071" y="2276872"/>
-            <a:ext cx="8210550" cy="4000500"/>
+            <a:off x="707731" y="4221088"/>
+            <a:ext cx="8086725" cy="2066925"/>
           </a:xfrm>
           <a:prstGeom prst="rect">
             <a:avLst/>
@@ -6601,83 +7195,7 @@
   <p:timing>
     <p:tnLst>
       <p:par>
-        <p:cTn id="1" dur="indefinite" restart="never" nodeType="tmRoot">
-          <p:childTnLst>
-            <p:seq concurrent="1" nextAc="seek">
-              <p:cTn id="2" dur="indefinite" nodeType="mainSeq">
-                <p:childTnLst>
-                  <p:par>
-                    <p:cTn id="3" fill="hold">
-                      <p:stCondLst>
-                        <p:cond delay="indefinite"/>
-                      </p:stCondLst>
-                      <p:childTnLst>
-                        <p:par>
-                          <p:cTn id="4" fill="hold">
-                            <p:stCondLst>
-                              <p:cond delay="0"/>
-                            </p:stCondLst>
-                            <p:childTnLst>
-                              <p:par>
-                                <p:cTn id="5" presetID="22" presetClass="entr" presetSubtype="1" fill="hold" nodeType="clickEffect">
-                                  <p:stCondLst>
-                                    <p:cond delay="0"/>
-                                  </p:stCondLst>
-                                  <p:childTnLst>
-                                    <p:set>
-                                      <p:cBhvr>
-                                        <p:cTn id="6" dur="1" fill="hold">
-                                          <p:stCondLst>
-                                            <p:cond delay="0"/>
-                                          </p:stCondLst>
-                                        </p:cTn>
-                                        <p:tgtEl>
-                                          <p:spTgt spid="5124"/>
-                                        </p:tgtEl>
-                                        <p:attrNameLst>
-                                          <p:attrName>style.visibility</p:attrName>
-                                        </p:attrNameLst>
-                                      </p:cBhvr>
-                                      <p:to>
-                                        <p:strVal val="visible"/>
-                                      </p:to>
-                                    </p:set>
-                                    <p:animEffect transition="in" filter="wipe(up)">
-                                      <p:cBhvr>
-                                        <p:cTn id="7" dur="500"/>
-                                        <p:tgtEl>
-                                          <p:spTgt spid="5124"/>
-                                        </p:tgtEl>
-                                      </p:cBhvr>
-                                    </p:animEffect>
-                                  </p:childTnLst>
-                                </p:cTn>
-                              </p:par>
-                            </p:childTnLst>
-                          </p:cTn>
-                        </p:par>
-                      </p:childTnLst>
-                    </p:cTn>
-                  </p:par>
-                </p:childTnLst>
-              </p:cTn>
-              <p:prevCondLst>
-                <p:cond evt="onPrev" delay="0">
-                  <p:tgtEl>
-                    <p:sldTgt/>
-                  </p:tgtEl>
-                </p:cond>
-              </p:prevCondLst>
-              <p:nextCondLst>
-                <p:cond evt="onNext" delay="0">
-                  <p:tgtEl>
-                    <p:sldTgt/>
-                  </p:tgtEl>
-                </p:cond>
-              </p:nextCondLst>
-            </p:seq>
-          </p:childTnLst>
-        </p:cTn>
+        <p:cTn id="1" dur="indefinite" restart="never" nodeType="tmRoot"/>
       </p:par>
     </p:tnLst>
   </p:timing>

</xml_diff>

<commit_message>
Atualização da apresentação, entregue na aula
</commit_message>
<xml_diff>
--- a/CAP385-00-Presentations/01-MATLAB xUnit Test Framework.pptx
+++ b/CAP385-00-Presentations/01-MATLAB xUnit Test Framework.pptx
@@ -203,7 +203,7 @@
             <a:fld id="{3DB25566-8A38-405D-AF46-A7AC913A6215}" type="datetimeFigureOut">
               <a:rPr lang="pt-BR" smtClean="0"/>
               <a:pPr/>
-              <a:t>11/07/2016</a:t>
+              <a:t>12/07/2016</a:t>
             </a:fld>
             <a:endParaRPr lang="pt-BR"/>
           </a:p>
@@ -736,7 +736,7 @@
             <a:fld id="{97BE082F-75F0-4080-8642-9DC0E9DA7233}" type="datetimeFigureOut">
               <a:rPr lang="pt-BR" smtClean="0"/>
               <a:pPr/>
-              <a:t>11/07/2016</a:t>
+              <a:t>12/07/2016</a:t>
             </a:fld>
             <a:endParaRPr lang="pt-BR"/>
           </a:p>
@@ -908,7 +908,7 @@
             <a:fld id="{97BE082F-75F0-4080-8642-9DC0E9DA7233}" type="datetimeFigureOut">
               <a:rPr lang="pt-BR" smtClean="0"/>
               <a:pPr/>
-              <a:t>11/07/2016</a:t>
+              <a:t>12/07/2016</a:t>
             </a:fld>
             <a:endParaRPr lang="pt-BR"/>
           </a:p>
@@ -1090,7 +1090,7 @@
             <a:fld id="{97BE082F-75F0-4080-8642-9DC0E9DA7233}" type="datetimeFigureOut">
               <a:rPr lang="pt-BR" smtClean="0"/>
               <a:pPr/>
-              <a:t>11/07/2016</a:t>
+              <a:t>12/07/2016</a:t>
             </a:fld>
             <a:endParaRPr lang="pt-BR"/>
           </a:p>
@@ -1444,7 +1444,7 @@
             <a:fld id="{97BE082F-75F0-4080-8642-9DC0E9DA7233}" type="datetimeFigureOut">
               <a:rPr lang="pt-BR" smtClean="0"/>
               <a:pPr/>
-              <a:t>11/07/2016</a:t>
+              <a:t>12/07/2016</a:t>
             </a:fld>
             <a:endParaRPr lang="pt-BR"/>
           </a:p>
@@ -1692,7 +1692,7 @@
             <a:fld id="{97BE082F-75F0-4080-8642-9DC0E9DA7233}" type="datetimeFigureOut">
               <a:rPr lang="pt-BR" smtClean="0"/>
               <a:pPr/>
-              <a:t>11/07/2016</a:t>
+              <a:t>12/07/2016</a:t>
             </a:fld>
             <a:endParaRPr lang="pt-BR"/>
           </a:p>
@@ -1982,7 +1982,7 @@
             <a:fld id="{97BE082F-75F0-4080-8642-9DC0E9DA7233}" type="datetimeFigureOut">
               <a:rPr lang="pt-BR" smtClean="0"/>
               <a:pPr/>
-              <a:t>11/07/2016</a:t>
+              <a:t>12/07/2016</a:t>
             </a:fld>
             <a:endParaRPr lang="pt-BR"/>
           </a:p>
@@ -2406,7 +2406,7 @@
             <a:fld id="{97BE082F-75F0-4080-8642-9DC0E9DA7233}" type="datetimeFigureOut">
               <a:rPr lang="pt-BR" smtClean="0"/>
               <a:pPr/>
-              <a:t>11/07/2016</a:t>
+              <a:t>12/07/2016</a:t>
             </a:fld>
             <a:endParaRPr lang="pt-BR"/>
           </a:p>
@@ -2526,7 +2526,7 @@
             <a:fld id="{97BE082F-75F0-4080-8642-9DC0E9DA7233}" type="datetimeFigureOut">
               <a:rPr lang="pt-BR" smtClean="0"/>
               <a:pPr/>
-              <a:t>11/07/2016</a:t>
+              <a:t>12/07/2016</a:t>
             </a:fld>
             <a:endParaRPr lang="pt-BR"/>
           </a:p>
@@ -2623,7 +2623,7 @@
             <a:fld id="{97BE082F-75F0-4080-8642-9DC0E9DA7233}" type="datetimeFigureOut">
               <a:rPr lang="pt-BR" smtClean="0"/>
               <a:pPr/>
-              <a:t>11/07/2016</a:t>
+              <a:t>12/07/2016</a:t>
             </a:fld>
             <a:endParaRPr lang="pt-BR"/>
           </a:p>
@@ -2902,7 +2902,7 @@
             <a:fld id="{97BE082F-75F0-4080-8642-9DC0E9DA7233}" type="datetimeFigureOut">
               <a:rPr lang="pt-BR" smtClean="0"/>
               <a:pPr/>
-              <a:t>11/07/2016</a:t>
+              <a:t>12/07/2016</a:t>
             </a:fld>
             <a:endParaRPr lang="pt-BR"/>
           </a:p>
@@ -3157,7 +3157,7 @@
             <a:fld id="{97BE082F-75F0-4080-8642-9DC0E9DA7233}" type="datetimeFigureOut">
               <a:rPr lang="pt-BR" smtClean="0"/>
               <a:pPr/>
-              <a:t>11/07/2016</a:t>
+              <a:t>12/07/2016</a:t>
             </a:fld>
             <a:endParaRPr lang="pt-BR"/>
           </a:p>
@@ -3372,7 +3372,7 @@
             <a:fld id="{97BE082F-75F0-4080-8642-9DC0E9DA7233}" type="datetimeFigureOut">
               <a:rPr lang="pt-BR" smtClean="0"/>
               <a:pPr/>
-              <a:t>11/07/2016</a:t>
+              <a:t>12/07/2016</a:t>
             </a:fld>
             <a:endParaRPr lang="pt-BR"/>
           </a:p>
@@ -4477,6 +4477,45 @@
           </a:p>
           <a:p>
             <a:pPr lvl="1"/>
+            <a:r>
+              <a:rPr lang="pt-BR" dirty="0" smtClean="0"/>
+              <a:t>Extensões</a:t>
+            </a:r>
+          </a:p>
+          <a:p>
+            <a:pPr lvl="2"/>
+            <a:r>
+              <a:rPr lang="pt-BR" dirty="0" err="1" smtClean="0"/>
+              <a:t>TestRunner</a:t>
+            </a:r>
+            <a:endParaRPr lang="pt-BR" dirty="0" smtClean="0"/>
+          </a:p>
+          <a:p>
+            <a:pPr lvl="2"/>
+            <a:r>
+              <a:rPr lang="pt-BR" dirty="0" err="1" smtClean="0"/>
+              <a:t>Constraints</a:t>
+            </a:r>
+            <a:endParaRPr lang="pt-BR" dirty="0" smtClean="0"/>
+          </a:p>
+          <a:p>
+            <a:pPr lvl="2"/>
+            <a:r>
+              <a:rPr lang="pt-BR" dirty="0" err="1" smtClean="0"/>
+              <a:t>Tolerance</a:t>
+            </a:r>
+            <a:endParaRPr lang="pt-BR" dirty="0" smtClean="0"/>
+          </a:p>
+          <a:p>
+            <a:pPr lvl="2"/>
+            <a:r>
+              <a:rPr lang="pt-BR" dirty="0" err="1" smtClean="0"/>
+              <a:t>Fixtures</a:t>
+            </a:r>
+            <a:endParaRPr lang="pt-BR" dirty="0" smtClean="0"/>
+          </a:p>
+          <a:p>
+            <a:pPr lvl="1"/>
             <a:endParaRPr lang="pt-BR" dirty="0" smtClean="0"/>
           </a:p>
           <a:p>
@@ -4785,7 +4824,6 @@
               <a:rPr lang="pt-BR" dirty="0" smtClean="0"/>
               <a:t>Considerações</a:t>
             </a:r>
-            <a:endParaRPr lang="pt-BR" dirty="0" smtClean="0"/>
           </a:p>
         </p:txBody>
       </p:sp>
@@ -5017,7 +5055,15 @@
             <a:pPr lvl="1"/>
             <a:r>
               <a:rPr lang="pt-BR" dirty="0" smtClean="0"/>
-              <a:t>Linguagem de programação computacional, usando como base o cálculo de matrizes e suas aplicações</a:t>
+              <a:t>Linguagem </a:t>
+            </a:r>
+            <a:r>
+              <a:rPr lang="pt-BR" dirty="0" smtClean="0"/>
+              <a:t>para computação científica, </a:t>
+            </a:r>
+            <a:r>
+              <a:rPr lang="pt-BR" dirty="0" smtClean="0"/>
+              <a:t>usando como base o cálculo de matrizes e suas aplicações</a:t>
             </a:r>
           </a:p>
           <a:p>
@@ -6467,11 +6513,11 @@
   <p:clrMapOvr>
     <a:masterClrMapping/>
   </p:clrMapOvr>
-  <mc:AlternateContent xmlns:mc="http://schemas.openxmlformats.org/markup-compatibility/2006">
-    <mc:Choice xmlns:p14="http://schemas.microsoft.com/office/powerpoint/2010/main" Requires="p14">
+  <mc:AlternateContent xmlns:mc="http://schemas.openxmlformats.org/markup-compatibility/2006" xmlns:p14="http://schemas.microsoft.com/office/powerpoint/2010/main">
+    <mc:Choice Requires="p14">
       <p:transition p14:dur="10"/>
     </mc:Choice>
-    <mc:Fallback>
+    <mc:Fallback xmlns="">
       <p:transition/>
     </mc:Fallback>
   </mc:AlternateContent>
@@ -7184,11 +7230,11 @@
   <p:clrMapOvr>
     <a:masterClrMapping/>
   </p:clrMapOvr>
-  <mc:AlternateContent xmlns:mc="http://schemas.openxmlformats.org/markup-compatibility/2006">
-    <mc:Choice xmlns:p14="http://schemas.microsoft.com/office/powerpoint/2010/main" Requires="p14">
+  <mc:AlternateContent xmlns:mc="http://schemas.openxmlformats.org/markup-compatibility/2006" xmlns:p14="http://schemas.microsoft.com/office/powerpoint/2010/main">
+    <mc:Choice Requires="p14">
       <p:transition p14:dur="10"/>
     </mc:Choice>
-    <mc:Fallback>
+    <mc:Fallback xmlns="">
       <p:transition/>
     </mc:Fallback>
   </mc:AlternateContent>

</xml_diff>